<commit_message>
first revision of ppt
</commit_message>
<xml_diff>
--- a/E91 Quantum Key Distribution Network.pptx
+++ b/E91 Quantum Key Distribution Network.pptx
@@ -10,8 +10,10 @@
     <p:sldId id="261" r:id="rId4"/>
     <p:sldId id="259" r:id="rId5"/>
     <p:sldId id="258" r:id="rId6"/>
-    <p:sldId id="262" r:id="rId7"/>
-    <p:sldId id="260" r:id="rId8"/>
+    <p:sldId id="264" r:id="rId7"/>
+    <p:sldId id="262" r:id="rId8"/>
+    <p:sldId id="260" r:id="rId9"/>
+    <p:sldId id="263" r:id="rId10"/>
   </p:sldIdLst>
   <p:sldSz cx="12192000" cy="6858000"/>
   <p:notesSz cx="6858000" cy="9144000"/>
@@ -3444,6 +3446,55 @@
       </p:grpSpPr>
       <p:sp>
         <p:nvSpPr>
+          <p:cNvPr id="13" name="Thought Bubble: Cloud 12">
+            <a:extLst>
+              <a:ext uri="{FF2B5EF4-FFF2-40B4-BE49-F238E27FC236}">
+                <a16:creationId xmlns:a16="http://schemas.microsoft.com/office/drawing/2014/main" id="{15785B82-C00E-4D90-8AF9-311078A9374B}"/>
+              </a:ext>
+            </a:extLst>
+          </p:cNvPr>
+          <p:cNvSpPr/>
+          <p:nvPr/>
+        </p:nvSpPr>
+        <p:spPr>
+          <a:xfrm>
+            <a:off x="9795933" y="4711132"/>
+            <a:ext cx="3412067" cy="2832668"/>
+          </a:xfrm>
+          <a:prstGeom prst="cloudCallout">
+            <a:avLst>
+              <a:gd name="adj1" fmla="val 73724"/>
+              <a:gd name="adj2" fmla="val 50735"/>
+            </a:avLst>
+          </a:prstGeom>
+        </p:spPr>
+        <p:style>
+          <a:lnRef idx="2">
+            <a:schemeClr val="accent1">
+              <a:shade val="50000"/>
+            </a:schemeClr>
+          </a:lnRef>
+          <a:fillRef idx="1">
+            <a:schemeClr val="accent1"/>
+          </a:fillRef>
+          <a:effectRef idx="0">
+            <a:schemeClr val="accent1"/>
+          </a:effectRef>
+          <a:fontRef idx="minor">
+            <a:schemeClr val="lt1"/>
+          </a:fontRef>
+        </p:style>
+        <p:txBody>
+          <a:bodyPr rtlCol="0" anchor="ctr"/>
+          <a:lstStyle/>
+          <a:p>
+            <a:pPr algn="ctr"/>
+            <a:endParaRPr lang="en-US"/>
+          </a:p>
+        </p:txBody>
+      </p:sp>
+      <p:sp>
+        <p:nvSpPr>
           <p:cNvPr id="2" name="Title 1">
             <a:extLst>
               <a:ext uri="{FF2B5EF4-FFF2-40B4-BE49-F238E27FC236}">
@@ -3470,31 +3521,1629 @@
           </a:p>
         </p:txBody>
       </p:sp>
-      <p:sp>
-        <p:nvSpPr>
-          <p:cNvPr id="3" name="Content Placeholder 2">
-            <a:extLst>
-              <a:ext uri="{FF2B5EF4-FFF2-40B4-BE49-F238E27FC236}">
-                <a16:creationId xmlns:a16="http://schemas.microsoft.com/office/drawing/2014/main" id="{7763AB3C-A12D-4B41-AFA5-B7C0DA94F63E}"/>
-              </a:ext>
-            </a:extLst>
-          </p:cNvPr>
-          <p:cNvSpPr>
-            <a:spLocks noGrp="1"/>
-          </p:cNvSpPr>
-          <p:nvPr>
-            <p:ph idx="1"/>
-          </p:nvPr>
-        </p:nvSpPr>
-        <p:spPr/>
-        <p:txBody>
-          <a:bodyPr/>
-          <a:lstStyle/>
-          <a:p>
-            <a:r>
-              <a:rPr lang="en-US" dirty="0"/>
-              <a:t>[Graphic showing the approximate structure of our solution]</a:t>
-            </a:r>
+      <p:pic>
+        <p:nvPicPr>
+          <p:cNvPr id="5" name="Graphic 4" descr="Cmd Terminal with solid fill">
+            <a:extLst>
+              <a:ext uri="{FF2B5EF4-FFF2-40B4-BE49-F238E27FC236}">
+                <a16:creationId xmlns:a16="http://schemas.microsoft.com/office/drawing/2014/main" id="{79AFB4B7-4858-405E-8001-A3B15E318600}"/>
+              </a:ext>
+            </a:extLst>
+          </p:cNvPr>
+          <p:cNvPicPr>
+            <a:picLocks noChangeAspect="1"/>
+          </p:cNvPicPr>
+          <p:nvPr/>
+        </p:nvPicPr>
+        <p:blipFill>
+          <a:blip r:embed="rId2">
+            <a:extLst>
+              <a:ext uri="{28A0092B-C50C-407E-A947-70E740481C1C}">
+                <a14:useLocalDpi xmlns:a14="http://schemas.microsoft.com/office/drawing/2010/main" val="0"/>
+              </a:ext>
+              <a:ext uri="{96DAC541-7B7A-43D3-8B79-37D633B846F1}">
+                <asvg:svgBlip xmlns:asvg="http://schemas.microsoft.com/office/drawing/2016/SVG/main" r:embed="rId3"/>
+              </a:ext>
+            </a:extLst>
+          </a:blip>
+          <a:stretch>
+            <a:fillRect/>
+          </a:stretch>
+        </p:blipFill>
+        <p:spPr>
+          <a:xfrm>
+            <a:off x="8246534" y="3796732"/>
+            <a:ext cx="914400" cy="914400"/>
+          </a:xfrm>
+          <a:prstGeom prst="rect">
+            <a:avLst/>
+          </a:prstGeom>
+        </p:spPr>
+      </p:pic>
+      <p:pic>
+        <p:nvPicPr>
+          <p:cNvPr id="9" name="Graphic 8" descr="Processor with solid fill">
+            <a:extLst>
+              <a:ext uri="{FF2B5EF4-FFF2-40B4-BE49-F238E27FC236}">
+                <a16:creationId xmlns:a16="http://schemas.microsoft.com/office/drawing/2014/main" id="{426215BD-01CA-4661-AC5B-B77580E181A4}"/>
+              </a:ext>
+            </a:extLst>
+          </p:cNvPr>
+          <p:cNvPicPr>
+            <a:picLocks noChangeAspect="1"/>
+          </p:cNvPicPr>
+          <p:nvPr/>
+        </p:nvPicPr>
+        <p:blipFill>
+          <a:blip r:embed="rId4">
+            <a:extLst>
+              <a:ext uri="{28A0092B-C50C-407E-A947-70E740481C1C}">
+                <a14:useLocalDpi xmlns:a14="http://schemas.microsoft.com/office/drawing/2010/main" val="0"/>
+              </a:ext>
+              <a:ext uri="{96DAC541-7B7A-43D3-8B79-37D633B846F1}">
+                <asvg:svgBlip xmlns:asvg="http://schemas.microsoft.com/office/drawing/2016/SVG/main" r:embed="rId5"/>
+              </a:ext>
+            </a:extLst>
+          </a:blip>
+          <a:stretch>
+            <a:fillRect/>
+          </a:stretch>
+        </p:blipFill>
+        <p:spPr>
+          <a:xfrm>
+            <a:off x="10439400" y="5058266"/>
+            <a:ext cx="914400" cy="914400"/>
+          </a:xfrm>
+          <a:prstGeom prst="rect">
+            <a:avLst/>
+          </a:prstGeom>
+        </p:spPr>
+      </p:pic>
+      <p:cxnSp>
+        <p:nvCxnSpPr>
+          <p:cNvPr id="12" name="Straight Arrow Connector 11">
+            <a:extLst>
+              <a:ext uri="{FF2B5EF4-FFF2-40B4-BE49-F238E27FC236}">
+                <a16:creationId xmlns:a16="http://schemas.microsoft.com/office/drawing/2014/main" id="{DF4872C3-6A5D-4B3F-A25D-399DE67EF8CF}"/>
+              </a:ext>
+            </a:extLst>
+          </p:cNvPr>
+          <p:cNvCxnSpPr>
+            <a:cxnSpLocks/>
+          </p:cNvCxnSpPr>
+          <p:nvPr/>
+        </p:nvCxnSpPr>
+        <p:spPr>
+          <a:xfrm>
+            <a:off x="9106667" y="4463551"/>
+            <a:ext cx="1254799" cy="721716"/>
+          </a:xfrm>
+          <a:prstGeom prst="straightConnector1">
+            <a:avLst/>
+          </a:prstGeom>
+          <a:ln w="76200">
+            <a:solidFill>
+              <a:schemeClr val="dk1"/>
+            </a:solidFill>
+            <a:headEnd type="triangle"/>
+            <a:tailEnd type="triangle"/>
+          </a:ln>
+        </p:spPr>
+        <p:style>
+          <a:lnRef idx="1">
+            <a:schemeClr val="dk1"/>
+          </a:lnRef>
+          <a:fillRef idx="0">
+            <a:schemeClr val="dk1"/>
+          </a:fillRef>
+          <a:effectRef idx="0">
+            <a:schemeClr val="dk1"/>
+          </a:effectRef>
+          <a:fontRef idx="minor">
+            <a:schemeClr val="tx1"/>
+          </a:fontRef>
+        </p:style>
+      </p:cxnSp>
+      <p:cxnSp>
+        <p:nvCxnSpPr>
+          <p:cNvPr id="15" name="Straight Arrow Connector 14">
+            <a:extLst>
+              <a:ext uri="{FF2B5EF4-FFF2-40B4-BE49-F238E27FC236}">
+                <a16:creationId xmlns:a16="http://schemas.microsoft.com/office/drawing/2014/main" id="{3D42ACAD-7AA7-4A5B-A59F-CBB316B63A2A}"/>
+              </a:ext>
+            </a:extLst>
+          </p:cNvPr>
+          <p:cNvCxnSpPr>
+            <a:cxnSpLocks/>
+          </p:cNvCxnSpPr>
+          <p:nvPr/>
+        </p:nvCxnSpPr>
+        <p:spPr>
+          <a:xfrm flipV="1">
+            <a:off x="9077074" y="3387688"/>
+            <a:ext cx="781472" cy="531254"/>
+          </a:xfrm>
+          <a:prstGeom prst="straightConnector1">
+            <a:avLst/>
+          </a:prstGeom>
+          <a:ln w="38100">
+            <a:headEnd type="triangle"/>
+            <a:tailEnd type="triangle"/>
+          </a:ln>
+        </p:spPr>
+        <p:style>
+          <a:lnRef idx="1">
+            <a:schemeClr val="dk1"/>
+          </a:lnRef>
+          <a:fillRef idx="0">
+            <a:schemeClr val="dk1"/>
+          </a:fillRef>
+          <a:effectRef idx="0">
+            <a:schemeClr val="dk1"/>
+          </a:effectRef>
+          <a:fontRef idx="minor">
+            <a:schemeClr val="tx1"/>
+          </a:fontRef>
+        </p:style>
+      </p:cxnSp>
+      <p:cxnSp>
+        <p:nvCxnSpPr>
+          <p:cNvPr id="19" name="Straight Arrow Connector 18">
+            <a:extLst>
+              <a:ext uri="{FF2B5EF4-FFF2-40B4-BE49-F238E27FC236}">
+                <a16:creationId xmlns:a16="http://schemas.microsoft.com/office/drawing/2014/main" id="{C434D32D-F720-4382-97D0-B43DD0B3FBE4}"/>
+              </a:ext>
+            </a:extLst>
+          </p:cNvPr>
+          <p:cNvCxnSpPr>
+            <a:cxnSpLocks/>
+          </p:cNvCxnSpPr>
+          <p:nvPr/>
+        </p:nvCxnSpPr>
+        <p:spPr>
+          <a:xfrm flipH="1">
+            <a:off x="9008454" y="2722543"/>
+            <a:ext cx="68620" cy="1119207"/>
+          </a:xfrm>
+          <a:prstGeom prst="straightConnector1">
+            <a:avLst/>
+          </a:prstGeom>
+          <a:ln w="38100">
+            <a:headEnd type="triangle"/>
+            <a:tailEnd type="triangle"/>
+          </a:ln>
+        </p:spPr>
+        <p:style>
+          <a:lnRef idx="1">
+            <a:schemeClr val="dk1"/>
+          </a:lnRef>
+          <a:fillRef idx="0">
+            <a:schemeClr val="dk1"/>
+          </a:fillRef>
+          <a:effectRef idx="0">
+            <a:schemeClr val="dk1"/>
+          </a:effectRef>
+          <a:fontRef idx="minor">
+            <a:schemeClr val="tx1"/>
+          </a:fontRef>
+        </p:style>
+      </p:cxnSp>
+      <p:grpSp>
+        <p:nvGrpSpPr>
+          <p:cNvPr id="23" name="Group 22">
+            <a:extLst>
+              <a:ext uri="{FF2B5EF4-FFF2-40B4-BE49-F238E27FC236}">
+                <a16:creationId xmlns:a16="http://schemas.microsoft.com/office/drawing/2014/main" id="{93FAA58E-7723-4277-A618-D79969541804}"/>
+              </a:ext>
+            </a:extLst>
+          </p:cNvPr>
+          <p:cNvGrpSpPr/>
+          <p:nvPr/>
+        </p:nvGrpSpPr>
+        <p:grpSpPr>
+          <a:xfrm>
+            <a:off x="9008454" y="1829230"/>
+            <a:ext cx="914479" cy="914479"/>
+            <a:chOff x="9008454" y="1829230"/>
+            <a:chExt cx="914479" cy="914479"/>
+          </a:xfrm>
+        </p:grpSpPr>
+        <p:pic>
+          <p:nvPicPr>
+            <p:cNvPr id="10" name="Picture 9">
+              <a:extLst>
+                <a:ext uri="{FF2B5EF4-FFF2-40B4-BE49-F238E27FC236}">
+                  <a16:creationId xmlns:a16="http://schemas.microsoft.com/office/drawing/2014/main" id="{61DAF371-710D-4D53-8744-5F6339C1E575}"/>
+                </a:ext>
+              </a:extLst>
+            </p:cNvPr>
+            <p:cNvPicPr>
+              <a:picLocks noChangeAspect="1"/>
+            </p:cNvPicPr>
+            <p:nvPr/>
+          </p:nvPicPr>
+          <p:blipFill>
+            <a:blip r:embed="rId6"/>
+            <a:stretch>
+              <a:fillRect/>
+            </a:stretch>
+          </p:blipFill>
+          <p:spPr>
+            <a:xfrm>
+              <a:off x="9008454" y="1829230"/>
+              <a:ext cx="914479" cy="914479"/>
+            </a:xfrm>
+            <a:prstGeom prst="rect">
+              <a:avLst/>
+            </a:prstGeom>
+          </p:spPr>
+        </p:pic>
+        <mc:AlternateContent xmlns:mc="http://schemas.openxmlformats.org/markup-compatibility/2006">
+          <mc:Choice xmlns:a14="http://schemas.microsoft.com/office/drawing/2010/main" Requires="a14">
+            <p:sp>
+              <p:nvSpPr>
+                <p:cNvPr id="22" name="TextBox 21">
+                  <a:extLst>
+                    <a:ext uri="{FF2B5EF4-FFF2-40B4-BE49-F238E27FC236}">
+                      <a16:creationId xmlns:a16="http://schemas.microsoft.com/office/drawing/2014/main" id="{C96024F0-6B1A-4618-91BD-98B8059B0E69}"/>
+                    </a:ext>
+                  </a:extLst>
+                </p:cNvPr>
+                <p:cNvSpPr txBox="1"/>
+                <p:nvPr/>
+              </p:nvSpPr>
+              <p:spPr>
+                <a:xfrm>
+                  <a:off x="9106667" y="2050036"/>
+                  <a:ext cx="454276" cy="338554"/>
+                </a:xfrm>
+                <a:prstGeom prst="rect">
+                  <a:avLst/>
+                </a:prstGeom>
+                <a:noFill/>
+              </p:spPr>
+              <p:txBody>
+                <a:bodyPr wrap="square" rtlCol="0">
+                  <a:spAutoFit/>
+                </a:bodyPr>
+                <a:lstStyle/>
+                <a:p>
+                  <a14:m>
+                    <m:oMathPara xmlns:m="http://schemas.openxmlformats.org/officeDocument/2006/math">
+                      <m:oMathParaPr>
+                        <m:jc m:val="centerGroup"/>
+                      </m:oMathParaPr>
+                      <m:oMath xmlns:m="http://schemas.openxmlformats.org/officeDocument/2006/math">
+                        <m:sSub>
+                          <m:sSubPr>
+                            <m:ctrlPr>
+                              <a:rPr lang="en-US" sz="1600" i="1" smtClean="0">
+                                <a:latin typeface="Cambria Math" panose="02040503050406030204" pitchFamily="18" charset="0"/>
+                              </a:rPr>
+                            </m:ctrlPr>
+                          </m:sSubPr>
+                          <m:e>
+                            <m:r>
+                              <a:rPr lang="en-US" sz="1600" b="0" i="1" smtClean="0">
+                                <a:latin typeface="Cambria Math" panose="02040503050406030204" pitchFamily="18" charset="0"/>
+                              </a:rPr>
+                              <m:t>𝐴</m:t>
+                            </m:r>
+                          </m:e>
+                          <m:sub>
+                            <m:r>
+                              <a:rPr lang="en-US" sz="1600" b="0" i="1" smtClean="0">
+                                <a:latin typeface="Cambria Math" panose="02040503050406030204" pitchFamily="18" charset="0"/>
+                              </a:rPr>
+                              <m:t>1</m:t>
+                            </m:r>
+                          </m:sub>
+                        </m:sSub>
+                      </m:oMath>
+                    </m:oMathPara>
+                  </a14:m>
+                  <a:endParaRPr lang="en-US" dirty="0"/>
+                </a:p>
+              </p:txBody>
+            </p:sp>
+          </mc:Choice>
+          <mc:Fallback>
+            <p:sp>
+              <p:nvSpPr>
+                <p:cNvPr id="22" name="TextBox 21">
+                  <a:extLst>
+                    <a:ext uri="{FF2B5EF4-FFF2-40B4-BE49-F238E27FC236}">
+                      <a16:creationId xmlns:a16="http://schemas.microsoft.com/office/drawing/2014/main" id="{C96024F0-6B1A-4618-91BD-98B8059B0E69}"/>
+                    </a:ext>
+                  </a:extLst>
+                </p:cNvPr>
+                <p:cNvSpPr txBox="1">
+                  <a:spLocks noRot="1" noChangeAspect="1" noMove="1" noResize="1" noEditPoints="1" noAdjustHandles="1" noChangeArrowheads="1" noChangeShapeType="1" noTextEdit="1"/>
+                </p:cNvSpPr>
+                <p:nvPr/>
+              </p:nvSpPr>
+              <p:spPr>
+                <a:xfrm>
+                  <a:off x="9106667" y="2050036"/>
+                  <a:ext cx="454276" cy="338554"/>
+                </a:xfrm>
+                <a:prstGeom prst="rect">
+                  <a:avLst/>
+                </a:prstGeom>
+                <a:blipFill>
+                  <a:blip r:embed="rId7"/>
+                  <a:stretch>
+                    <a:fillRect/>
+                  </a:stretch>
+                </a:blipFill>
+              </p:spPr>
+              <p:txBody>
+                <a:bodyPr/>
+                <a:lstStyle/>
+                <a:p>
+                  <a:r>
+                    <a:rPr lang="en-US">
+                      <a:noFill/>
+                    </a:rPr>
+                    <a:t> </a:t>
+                  </a:r>
+                </a:p>
+              </p:txBody>
+            </p:sp>
+          </mc:Fallback>
+        </mc:AlternateContent>
+      </p:grpSp>
+      <p:grpSp>
+        <p:nvGrpSpPr>
+          <p:cNvPr id="25" name="Group 24">
+            <a:extLst>
+              <a:ext uri="{FF2B5EF4-FFF2-40B4-BE49-F238E27FC236}">
+                <a16:creationId xmlns:a16="http://schemas.microsoft.com/office/drawing/2014/main" id="{2EF69E3F-B530-479F-AB7C-C1278F345AAB}"/>
+              </a:ext>
+            </a:extLst>
+          </p:cNvPr>
+          <p:cNvGrpSpPr/>
+          <p:nvPr/>
+        </p:nvGrpSpPr>
+        <p:grpSpPr>
+          <a:xfrm>
+            <a:off x="9871246" y="2756882"/>
+            <a:ext cx="914479" cy="914479"/>
+            <a:chOff x="9008454" y="1829230"/>
+            <a:chExt cx="914479" cy="914479"/>
+          </a:xfrm>
+        </p:grpSpPr>
+        <p:pic>
+          <p:nvPicPr>
+            <p:cNvPr id="26" name="Picture 25">
+              <a:extLst>
+                <a:ext uri="{FF2B5EF4-FFF2-40B4-BE49-F238E27FC236}">
+                  <a16:creationId xmlns:a16="http://schemas.microsoft.com/office/drawing/2014/main" id="{928A0AF4-30BF-4C40-83AF-685840B2D045}"/>
+                </a:ext>
+              </a:extLst>
+            </p:cNvPr>
+            <p:cNvPicPr>
+              <a:picLocks noChangeAspect="1"/>
+            </p:cNvPicPr>
+            <p:nvPr/>
+          </p:nvPicPr>
+          <p:blipFill>
+            <a:blip r:embed="rId6"/>
+            <a:stretch>
+              <a:fillRect/>
+            </a:stretch>
+          </p:blipFill>
+          <p:spPr>
+            <a:xfrm>
+              <a:off x="9008454" y="1829230"/>
+              <a:ext cx="914479" cy="914479"/>
+            </a:xfrm>
+            <a:prstGeom prst="rect">
+              <a:avLst/>
+            </a:prstGeom>
+          </p:spPr>
+        </p:pic>
+        <mc:AlternateContent xmlns:mc="http://schemas.openxmlformats.org/markup-compatibility/2006">
+          <mc:Choice xmlns:a14="http://schemas.microsoft.com/office/drawing/2010/main" Requires="a14">
+            <p:sp>
+              <p:nvSpPr>
+                <p:cNvPr id="27" name="TextBox 26">
+                  <a:extLst>
+                    <a:ext uri="{FF2B5EF4-FFF2-40B4-BE49-F238E27FC236}">
+                      <a16:creationId xmlns:a16="http://schemas.microsoft.com/office/drawing/2014/main" id="{05A25834-71AF-425A-9380-806373159972}"/>
+                    </a:ext>
+                  </a:extLst>
+                </p:cNvPr>
+                <p:cNvSpPr txBox="1"/>
+                <p:nvPr/>
+              </p:nvSpPr>
+              <p:spPr>
+                <a:xfrm>
+                  <a:off x="9106667" y="2050036"/>
+                  <a:ext cx="454276" cy="338554"/>
+                </a:xfrm>
+                <a:prstGeom prst="rect">
+                  <a:avLst/>
+                </a:prstGeom>
+                <a:noFill/>
+              </p:spPr>
+              <p:txBody>
+                <a:bodyPr wrap="square" rtlCol="0">
+                  <a:spAutoFit/>
+                </a:bodyPr>
+                <a:lstStyle/>
+                <a:p>
+                  <a14:m>
+                    <m:oMathPara xmlns:m="http://schemas.openxmlformats.org/officeDocument/2006/math">
+                      <m:oMathParaPr>
+                        <m:jc m:val="centerGroup"/>
+                      </m:oMathParaPr>
+                      <m:oMath xmlns:m="http://schemas.openxmlformats.org/officeDocument/2006/math">
+                        <m:sSub>
+                          <m:sSubPr>
+                            <m:ctrlPr>
+                              <a:rPr lang="en-US" sz="1600" i="1" smtClean="0">
+                                <a:latin typeface="Cambria Math" panose="02040503050406030204" pitchFamily="18" charset="0"/>
+                              </a:rPr>
+                            </m:ctrlPr>
+                          </m:sSubPr>
+                          <m:e>
+                            <m:r>
+                              <a:rPr lang="en-US" sz="1600" b="0" i="1" smtClean="0">
+                                <a:latin typeface="Cambria Math" panose="02040503050406030204" pitchFamily="18" charset="0"/>
+                              </a:rPr>
+                              <m:t>𝐵</m:t>
+                            </m:r>
+                          </m:e>
+                          <m:sub>
+                            <m:r>
+                              <a:rPr lang="en-US" sz="1600" b="0" i="1" smtClean="0">
+                                <a:latin typeface="Cambria Math" panose="02040503050406030204" pitchFamily="18" charset="0"/>
+                              </a:rPr>
+                              <m:t>1</m:t>
+                            </m:r>
+                          </m:sub>
+                        </m:sSub>
+                      </m:oMath>
+                    </m:oMathPara>
+                  </a14:m>
+                  <a:endParaRPr lang="en-US" dirty="0"/>
+                </a:p>
+              </p:txBody>
+            </p:sp>
+          </mc:Choice>
+          <mc:Fallback>
+            <p:sp>
+              <p:nvSpPr>
+                <p:cNvPr id="27" name="TextBox 26">
+                  <a:extLst>
+                    <a:ext uri="{FF2B5EF4-FFF2-40B4-BE49-F238E27FC236}">
+                      <a16:creationId xmlns:a16="http://schemas.microsoft.com/office/drawing/2014/main" id="{05A25834-71AF-425A-9380-806373159972}"/>
+                    </a:ext>
+                  </a:extLst>
+                </p:cNvPr>
+                <p:cNvSpPr txBox="1">
+                  <a:spLocks noRot="1" noChangeAspect="1" noMove="1" noResize="1" noEditPoints="1" noAdjustHandles="1" noChangeArrowheads="1" noChangeShapeType="1" noTextEdit="1"/>
+                </p:cNvSpPr>
+                <p:nvPr/>
+              </p:nvSpPr>
+              <p:spPr>
+                <a:xfrm>
+                  <a:off x="9106667" y="2050036"/>
+                  <a:ext cx="454276" cy="338554"/>
+                </a:xfrm>
+                <a:prstGeom prst="rect">
+                  <a:avLst/>
+                </a:prstGeom>
+                <a:blipFill>
+                  <a:blip r:embed="rId8"/>
+                  <a:stretch>
+                    <a:fillRect/>
+                  </a:stretch>
+                </a:blipFill>
+              </p:spPr>
+              <p:txBody>
+                <a:bodyPr/>
+                <a:lstStyle/>
+                <a:p>
+                  <a:r>
+                    <a:rPr lang="en-US">
+                      <a:noFill/>
+                    </a:rPr>
+                    <a:t> </a:t>
+                  </a:r>
+                </a:p>
+              </p:txBody>
+            </p:sp>
+          </mc:Fallback>
+        </mc:AlternateContent>
+      </p:grpSp>
+      <p:grpSp>
+        <p:nvGrpSpPr>
+          <p:cNvPr id="28" name="Group 27">
+            <a:extLst>
+              <a:ext uri="{FF2B5EF4-FFF2-40B4-BE49-F238E27FC236}">
+                <a16:creationId xmlns:a16="http://schemas.microsoft.com/office/drawing/2014/main" id="{4C7D923A-C92D-4071-8FCC-F255D25FA1EE}"/>
+              </a:ext>
+            </a:extLst>
+          </p:cNvPr>
+          <p:cNvGrpSpPr/>
+          <p:nvPr/>
+        </p:nvGrpSpPr>
+        <p:grpSpPr>
+          <a:xfrm>
+            <a:off x="7172882" y="1931350"/>
+            <a:ext cx="914479" cy="914479"/>
+            <a:chOff x="9008454" y="1829230"/>
+            <a:chExt cx="914479" cy="914479"/>
+          </a:xfrm>
+        </p:grpSpPr>
+        <p:pic>
+          <p:nvPicPr>
+            <p:cNvPr id="29" name="Picture 28">
+              <a:extLst>
+                <a:ext uri="{FF2B5EF4-FFF2-40B4-BE49-F238E27FC236}">
+                  <a16:creationId xmlns:a16="http://schemas.microsoft.com/office/drawing/2014/main" id="{C6B6B50A-7AC0-4446-8B9D-D4F0045EDF04}"/>
+                </a:ext>
+              </a:extLst>
+            </p:cNvPr>
+            <p:cNvPicPr>
+              <a:picLocks noChangeAspect="1"/>
+            </p:cNvPicPr>
+            <p:nvPr/>
+          </p:nvPicPr>
+          <p:blipFill>
+            <a:blip r:embed="rId6"/>
+            <a:stretch>
+              <a:fillRect/>
+            </a:stretch>
+          </p:blipFill>
+          <p:spPr>
+            <a:xfrm>
+              <a:off x="9008454" y="1829230"/>
+              <a:ext cx="914479" cy="914479"/>
+            </a:xfrm>
+            <a:prstGeom prst="rect">
+              <a:avLst/>
+            </a:prstGeom>
+          </p:spPr>
+        </p:pic>
+        <mc:AlternateContent xmlns:mc="http://schemas.openxmlformats.org/markup-compatibility/2006">
+          <mc:Choice xmlns:a14="http://schemas.microsoft.com/office/drawing/2010/main" Requires="a14">
+            <p:sp>
+              <p:nvSpPr>
+                <p:cNvPr id="30" name="TextBox 29">
+                  <a:extLst>
+                    <a:ext uri="{FF2B5EF4-FFF2-40B4-BE49-F238E27FC236}">
+                      <a16:creationId xmlns:a16="http://schemas.microsoft.com/office/drawing/2014/main" id="{0244D057-3C83-464B-8364-9867CFDA01AC}"/>
+                    </a:ext>
+                  </a:extLst>
+                </p:cNvPr>
+                <p:cNvSpPr txBox="1"/>
+                <p:nvPr/>
+              </p:nvSpPr>
+              <p:spPr>
+                <a:xfrm>
+                  <a:off x="9106667" y="2050036"/>
+                  <a:ext cx="454276" cy="338554"/>
+                </a:xfrm>
+                <a:prstGeom prst="rect">
+                  <a:avLst/>
+                </a:prstGeom>
+                <a:noFill/>
+              </p:spPr>
+              <p:txBody>
+                <a:bodyPr wrap="square" rtlCol="0">
+                  <a:spAutoFit/>
+                </a:bodyPr>
+                <a:lstStyle/>
+                <a:p>
+                  <a14:m>
+                    <m:oMathPara xmlns:m="http://schemas.openxmlformats.org/officeDocument/2006/math">
+                      <m:oMathParaPr>
+                        <m:jc m:val="centerGroup"/>
+                      </m:oMathParaPr>
+                      <m:oMath xmlns:m="http://schemas.openxmlformats.org/officeDocument/2006/math">
+                        <m:sSub>
+                          <m:sSubPr>
+                            <m:ctrlPr>
+                              <a:rPr lang="en-US" sz="1600" i="1" smtClean="0">
+                                <a:latin typeface="Cambria Math" panose="02040503050406030204" pitchFamily="18" charset="0"/>
+                              </a:rPr>
+                            </m:ctrlPr>
+                          </m:sSubPr>
+                          <m:e>
+                            <m:r>
+                              <a:rPr lang="en-US" sz="1600" b="0" i="1" smtClean="0">
+                                <a:latin typeface="Cambria Math" panose="02040503050406030204" pitchFamily="18" charset="0"/>
+                              </a:rPr>
+                              <m:t>𝐴</m:t>
+                            </m:r>
+                          </m:e>
+                          <m:sub>
+                            <m:r>
+                              <a:rPr lang="en-US" sz="1600" b="0" i="1" smtClean="0">
+                                <a:latin typeface="Cambria Math" panose="02040503050406030204" pitchFamily="18" charset="0"/>
+                              </a:rPr>
+                              <m:t>2</m:t>
+                            </m:r>
+                          </m:sub>
+                        </m:sSub>
+                      </m:oMath>
+                    </m:oMathPara>
+                  </a14:m>
+                  <a:endParaRPr lang="en-US" dirty="0"/>
+                </a:p>
+              </p:txBody>
+            </p:sp>
+          </mc:Choice>
+          <mc:Fallback>
+            <p:sp>
+              <p:nvSpPr>
+                <p:cNvPr id="30" name="TextBox 29">
+                  <a:extLst>
+                    <a:ext uri="{FF2B5EF4-FFF2-40B4-BE49-F238E27FC236}">
+                      <a16:creationId xmlns:a16="http://schemas.microsoft.com/office/drawing/2014/main" id="{0244D057-3C83-464B-8364-9867CFDA01AC}"/>
+                    </a:ext>
+                  </a:extLst>
+                </p:cNvPr>
+                <p:cNvSpPr txBox="1">
+                  <a:spLocks noRot="1" noChangeAspect="1" noMove="1" noResize="1" noEditPoints="1" noAdjustHandles="1" noChangeArrowheads="1" noChangeShapeType="1" noTextEdit="1"/>
+                </p:cNvSpPr>
+                <p:nvPr/>
+              </p:nvSpPr>
+              <p:spPr>
+                <a:xfrm>
+                  <a:off x="9106667" y="2050036"/>
+                  <a:ext cx="454276" cy="338554"/>
+                </a:xfrm>
+                <a:prstGeom prst="rect">
+                  <a:avLst/>
+                </a:prstGeom>
+                <a:blipFill>
+                  <a:blip r:embed="rId9"/>
+                  <a:stretch>
+                    <a:fillRect/>
+                  </a:stretch>
+                </a:blipFill>
+              </p:spPr>
+              <p:txBody>
+                <a:bodyPr/>
+                <a:lstStyle/>
+                <a:p>
+                  <a:r>
+                    <a:rPr lang="en-US">
+                      <a:noFill/>
+                    </a:rPr>
+                    <a:t> </a:t>
+                  </a:r>
+                </a:p>
+              </p:txBody>
+            </p:sp>
+          </mc:Fallback>
+        </mc:AlternateContent>
+      </p:grpSp>
+      <p:grpSp>
+        <p:nvGrpSpPr>
+          <p:cNvPr id="31" name="Group 30">
+            <a:extLst>
+              <a:ext uri="{FF2B5EF4-FFF2-40B4-BE49-F238E27FC236}">
+                <a16:creationId xmlns:a16="http://schemas.microsoft.com/office/drawing/2014/main" id="{A55D4EB8-744B-4C3D-BDC6-361DA06BA2D9}"/>
+              </a:ext>
+            </a:extLst>
+          </p:cNvPr>
+          <p:cNvGrpSpPr/>
+          <p:nvPr/>
+        </p:nvGrpSpPr>
+        <p:grpSpPr>
+          <a:xfrm>
+            <a:off x="6112933" y="2286430"/>
+            <a:ext cx="914479" cy="914479"/>
+            <a:chOff x="9008454" y="1829230"/>
+            <a:chExt cx="914479" cy="914479"/>
+          </a:xfrm>
+        </p:grpSpPr>
+        <p:pic>
+          <p:nvPicPr>
+            <p:cNvPr id="32" name="Picture 31">
+              <a:extLst>
+                <a:ext uri="{FF2B5EF4-FFF2-40B4-BE49-F238E27FC236}">
+                  <a16:creationId xmlns:a16="http://schemas.microsoft.com/office/drawing/2014/main" id="{3803CC78-F094-4BB0-B9EF-911CC499C29E}"/>
+                </a:ext>
+              </a:extLst>
+            </p:cNvPr>
+            <p:cNvPicPr>
+              <a:picLocks noChangeAspect="1"/>
+            </p:cNvPicPr>
+            <p:nvPr/>
+          </p:nvPicPr>
+          <p:blipFill>
+            <a:blip r:embed="rId6"/>
+            <a:stretch>
+              <a:fillRect/>
+            </a:stretch>
+          </p:blipFill>
+          <p:spPr>
+            <a:xfrm>
+              <a:off x="9008454" y="1829230"/>
+              <a:ext cx="914479" cy="914479"/>
+            </a:xfrm>
+            <a:prstGeom prst="rect">
+              <a:avLst/>
+            </a:prstGeom>
+          </p:spPr>
+        </p:pic>
+        <mc:AlternateContent xmlns:mc="http://schemas.openxmlformats.org/markup-compatibility/2006">
+          <mc:Choice xmlns:a14="http://schemas.microsoft.com/office/drawing/2010/main" Requires="a14">
+            <p:sp>
+              <p:nvSpPr>
+                <p:cNvPr id="33" name="TextBox 32">
+                  <a:extLst>
+                    <a:ext uri="{FF2B5EF4-FFF2-40B4-BE49-F238E27FC236}">
+                      <a16:creationId xmlns:a16="http://schemas.microsoft.com/office/drawing/2014/main" id="{D128AC62-A97D-4029-A041-F8E1BD599810}"/>
+                    </a:ext>
+                  </a:extLst>
+                </p:cNvPr>
+                <p:cNvSpPr txBox="1"/>
+                <p:nvPr/>
+              </p:nvSpPr>
+              <p:spPr>
+                <a:xfrm>
+                  <a:off x="9106667" y="2050036"/>
+                  <a:ext cx="454276" cy="338554"/>
+                </a:xfrm>
+                <a:prstGeom prst="rect">
+                  <a:avLst/>
+                </a:prstGeom>
+                <a:noFill/>
+              </p:spPr>
+              <p:txBody>
+                <a:bodyPr wrap="square" rtlCol="0">
+                  <a:spAutoFit/>
+                </a:bodyPr>
+                <a:lstStyle/>
+                <a:p>
+                  <a14:m>
+                    <m:oMathPara xmlns:m="http://schemas.openxmlformats.org/officeDocument/2006/math">
+                      <m:oMathParaPr>
+                        <m:jc m:val="centerGroup"/>
+                      </m:oMathParaPr>
+                      <m:oMath xmlns:m="http://schemas.openxmlformats.org/officeDocument/2006/math">
+                        <m:sSub>
+                          <m:sSubPr>
+                            <m:ctrlPr>
+                              <a:rPr lang="en-US" sz="1600" i="1" smtClean="0">
+                                <a:latin typeface="Cambria Math" panose="02040503050406030204" pitchFamily="18" charset="0"/>
+                              </a:rPr>
+                            </m:ctrlPr>
+                          </m:sSubPr>
+                          <m:e>
+                            <m:r>
+                              <a:rPr lang="en-US" sz="1600" b="0" i="1" smtClean="0">
+                                <a:latin typeface="Cambria Math" panose="02040503050406030204" pitchFamily="18" charset="0"/>
+                              </a:rPr>
+                              <m:t>𝐵</m:t>
+                            </m:r>
+                          </m:e>
+                          <m:sub>
+                            <m:r>
+                              <a:rPr lang="en-US" sz="1600" b="0" i="1" smtClean="0">
+                                <a:latin typeface="Cambria Math" panose="02040503050406030204" pitchFamily="18" charset="0"/>
+                              </a:rPr>
+                              <m:t>2</m:t>
+                            </m:r>
+                          </m:sub>
+                        </m:sSub>
+                      </m:oMath>
+                    </m:oMathPara>
+                  </a14:m>
+                  <a:endParaRPr lang="en-US" dirty="0"/>
+                </a:p>
+              </p:txBody>
+            </p:sp>
+          </mc:Choice>
+          <mc:Fallback>
+            <p:sp>
+              <p:nvSpPr>
+                <p:cNvPr id="33" name="TextBox 32">
+                  <a:extLst>
+                    <a:ext uri="{FF2B5EF4-FFF2-40B4-BE49-F238E27FC236}">
+                      <a16:creationId xmlns:a16="http://schemas.microsoft.com/office/drawing/2014/main" id="{D128AC62-A97D-4029-A041-F8E1BD599810}"/>
+                    </a:ext>
+                  </a:extLst>
+                </p:cNvPr>
+                <p:cNvSpPr txBox="1">
+                  <a:spLocks noRot="1" noChangeAspect="1" noMove="1" noResize="1" noEditPoints="1" noAdjustHandles="1" noChangeArrowheads="1" noChangeShapeType="1" noTextEdit="1"/>
+                </p:cNvSpPr>
+                <p:nvPr/>
+              </p:nvSpPr>
+              <p:spPr>
+                <a:xfrm>
+                  <a:off x="9106667" y="2050036"/>
+                  <a:ext cx="454276" cy="338554"/>
+                </a:xfrm>
+                <a:prstGeom prst="rect">
+                  <a:avLst/>
+                </a:prstGeom>
+                <a:blipFill>
+                  <a:blip r:embed="rId10"/>
+                  <a:stretch>
+                    <a:fillRect/>
+                  </a:stretch>
+                </a:blipFill>
+              </p:spPr>
+              <p:txBody>
+                <a:bodyPr/>
+                <a:lstStyle/>
+                <a:p>
+                  <a:r>
+                    <a:rPr lang="en-US">
+                      <a:noFill/>
+                    </a:rPr>
+                    <a:t> </a:t>
+                  </a:r>
+                </a:p>
+              </p:txBody>
+            </p:sp>
+          </mc:Fallback>
+        </mc:AlternateContent>
+      </p:grpSp>
+      <p:grpSp>
+        <p:nvGrpSpPr>
+          <p:cNvPr id="34" name="Group 33">
+            <a:extLst>
+              <a:ext uri="{FF2B5EF4-FFF2-40B4-BE49-F238E27FC236}">
+                <a16:creationId xmlns:a16="http://schemas.microsoft.com/office/drawing/2014/main" id="{86198C34-D054-4856-8F0D-B1483CA4F4AD}"/>
+              </a:ext>
+            </a:extLst>
+          </p:cNvPr>
+          <p:cNvGrpSpPr/>
+          <p:nvPr/>
+        </p:nvGrpSpPr>
+        <p:grpSpPr>
+          <a:xfrm>
+            <a:off x="5597465" y="3549072"/>
+            <a:ext cx="914479" cy="914479"/>
+            <a:chOff x="9008454" y="1829230"/>
+            <a:chExt cx="914479" cy="914479"/>
+          </a:xfrm>
+        </p:grpSpPr>
+        <p:pic>
+          <p:nvPicPr>
+            <p:cNvPr id="35" name="Picture 34">
+              <a:extLst>
+                <a:ext uri="{FF2B5EF4-FFF2-40B4-BE49-F238E27FC236}">
+                  <a16:creationId xmlns:a16="http://schemas.microsoft.com/office/drawing/2014/main" id="{6FAD8B51-CEAA-4DFF-A1EA-1AE36D42402E}"/>
+                </a:ext>
+              </a:extLst>
+            </p:cNvPr>
+            <p:cNvPicPr>
+              <a:picLocks noChangeAspect="1"/>
+            </p:cNvPicPr>
+            <p:nvPr/>
+          </p:nvPicPr>
+          <p:blipFill>
+            <a:blip r:embed="rId6"/>
+            <a:stretch>
+              <a:fillRect/>
+            </a:stretch>
+          </p:blipFill>
+          <p:spPr>
+            <a:xfrm>
+              <a:off x="9008454" y="1829230"/>
+              <a:ext cx="914479" cy="914479"/>
+            </a:xfrm>
+            <a:prstGeom prst="rect">
+              <a:avLst/>
+            </a:prstGeom>
+          </p:spPr>
+        </p:pic>
+        <mc:AlternateContent xmlns:mc="http://schemas.openxmlformats.org/markup-compatibility/2006">
+          <mc:Choice xmlns:a14="http://schemas.microsoft.com/office/drawing/2010/main" Requires="a14">
+            <p:sp>
+              <p:nvSpPr>
+                <p:cNvPr id="36" name="TextBox 35">
+                  <a:extLst>
+                    <a:ext uri="{FF2B5EF4-FFF2-40B4-BE49-F238E27FC236}">
+                      <a16:creationId xmlns:a16="http://schemas.microsoft.com/office/drawing/2014/main" id="{E5532FA8-7766-4E36-AF75-1E37C36F6611}"/>
+                    </a:ext>
+                  </a:extLst>
+                </p:cNvPr>
+                <p:cNvSpPr txBox="1"/>
+                <p:nvPr/>
+              </p:nvSpPr>
+              <p:spPr>
+                <a:xfrm>
+                  <a:off x="9106667" y="2050036"/>
+                  <a:ext cx="454276" cy="338554"/>
+                </a:xfrm>
+                <a:prstGeom prst="rect">
+                  <a:avLst/>
+                </a:prstGeom>
+                <a:noFill/>
+              </p:spPr>
+              <p:txBody>
+                <a:bodyPr wrap="square" rtlCol="0">
+                  <a:spAutoFit/>
+                </a:bodyPr>
+                <a:lstStyle/>
+                <a:p>
+                  <a14:m>
+                    <m:oMathPara xmlns:m="http://schemas.openxmlformats.org/officeDocument/2006/math">
+                      <m:oMathParaPr>
+                        <m:jc m:val="centerGroup"/>
+                      </m:oMathParaPr>
+                      <m:oMath xmlns:m="http://schemas.openxmlformats.org/officeDocument/2006/math">
+                        <m:sSub>
+                          <m:sSubPr>
+                            <m:ctrlPr>
+                              <a:rPr lang="en-US" sz="1600" i="1" smtClean="0">
+                                <a:latin typeface="Cambria Math" panose="02040503050406030204" pitchFamily="18" charset="0"/>
+                              </a:rPr>
+                            </m:ctrlPr>
+                          </m:sSubPr>
+                          <m:e>
+                            <m:r>
+                              <a:rPr lang="en-US" sz="1600" b="0" i="1" smtClean="0">
+                                <a:latin typeface="Cambria Math" panose="02040503050406030204" pitchFamily="18" charset="0"/>
+                              </a:rPr>
+                              <m:t>𝐴</m:t>
+                            </m:r>
+                          </m:e>
+                          <m:sub>
+                            <m:r>
+                              <a:rPr lang="en-US" sz="1600" b="0" i="1" smtClean="0">
+                                <a:latin typeface="Cambria Math" panose="02040503050406030204" pitchFamily="18" charset="0"/>
+                              </a:rPr>
+                              <m:t>3</m:t>
+                            </m:r>
+                          </m:sub>
+                        </m:sSub>
+                      </m:oMath>
+                    </m:oMathPara>
+                  </a14:m>
+                  <a:endParaRPr lang="en-US" dirty="0"/>
+                </a:p>
+              </p:txBody>
+            </p:sp>
+          </mc:Choice>
+          <mc:Fallback>
+            <p:sp>
+              <p:nvSpPr>
+                <p:cNvPr id="36" name="TextBox 35">
+                  <a:extLst>
+                    <a:ext uri="{FF2B5EF4-FFF2-40B4-BE49-F238E27FC236}">
+                      <a16:creationId xmlns:a16="http://schemas.microsoft.com/office/drawing/2014/main" id="{E5532FA8-7766-4E36-AF75-1E37C36F6611}"/>
+                    </a:ext>
+                  </a:extLst>
+                </p:cNvPr>
+                <p:cNvSpPr txBox="1">
+                  <a:spLocks noRot="1" noChangeAspect="1" noMove="1" noResize="1" noEditPoints="1" noAdjustHandles="1" noChangeArrowheads="1" noChangeShapeType="1" noTextEdit="1"/>
+                </p:cNvSpPr>
+                <p:nvPr/>
+              </p:nvSpPr>
+              <p:spPr>
+                <a:xfrm>
+                  <a:off x="9106667" y="2050036"/>
+                  <a:ext cx="454276" cy="338554"/>
+                </a:xfrm>
+                <a:prstGeom prst="rect">
+                  <a:avLst/>
+                </a:prstGeom>
+                <a:blipFill>
+                  <a:blip r:embed="rId11"/>
+                  <a:stretch>
+                    <a:fillRect/>
+                  </a:stretch>
+                </a:blipFill>
+              </p:spPr>
+              <p:txBody>
+                <a:bodyPr/>
+                <a:lstStyle/>
+                <a:p>
+                  <a:r>
+                    <a:rPr lang="en-US">
+                      <a:noFill/>
+                    </a:rPr>
+                    <a:t> </a:t>
+                  </a:r>
+                </a:p>
+              </p:txBody>
+            </p:sp>
+          </mc:Fallback>
+        </mc:AlternateContent>
+      </p:grpSp>
+      <p:grpSp>
+        <p:nvGrpSpPr>
+          <p:cNvPr id="37" name="Group 36">
+            <a:extLst>
+              <a:ext uri="{FF2B5EF4-FFF2-40B4-BE49-F238E27FC236}">
+                <a16:creationId xmlns:a16="http://schemas.microsoft.com/office/drawing/2014/main" id="{BA0E5E9C-5A3B-4EEC-8061-BEB4B3193521}"/>
+              </a:ext>
+            </a:extLst>
+          </p:cNvPr>
+          <p:cNvGrpSpPr/>
+          <p:nvPr/>
+        </p:nvGrpSpPr>
+        <p:grpSpPr>
+          <a:xfrm>
+            <a:off x="5981044" y="4668062"/>
+            <a:ext cx="914479" cy="914479"/>
+            <a:chOff x="9008454" y="1829230"/>
+            <a:chExt cx="914479" cy="914479"/>
+          </a:xfrm>
+        </p:grpSpPr>
+        <p:pic>
+          <p:nvPicPr>
+            <p:cNvPr id="38" name="Picture 37">
+              <a:extLst>
+                <a:ext uri="{FF2B5EF4-FFF2-40B4-BE49-F238E27FC236}">
+                  <a16:creationId xmlns:a16="http://schemas.microsoft.com/office/drawing/2014/main" id="{0BF484F4-6A2F-46B7-89A1-0AA7997D4359}"/>
+                </a:ext>
+              </a:extLst>
+            </p:cNvPr>
+            <p:cNvPicPr>
+              <a:picLocks noChangeAspect="1"/>
+            </p:cNvPicPr>
+            <p:nvPr/>
+          </p:nvPicPr>
+          <p:blipFill>
+            <a:blip r:embed="rId6"/>
+            <a:stretch>
+              <a:fillRect/>
+            </a:stretch>
+          </p:blipFill>
+          <p:spPr>
+            <a:xfrm>
+              <a:off x="9008454" y="1829230"/>
+              <a:ext cx="914479" cy="914479"/>
+            </a:xfrm>
+            <a:prstGeom prst="rect">
+              <a:avLst/>
+            </a:prstGeom>
+          </p:spPr>
+        </p:pic>
+        <mc:AlternateContent xmlns:mc="http://schemas.openxmlformats.org/markup-compatibility/2006">
+          <mc:Choice xmlns:a14="http://schemas.microsoft.com/office/drawing/2010/main" Requires="a14">
+            <p:sp>
+              <p:nvSpPr>
+                <p:cNvPr id="39" name="TextBox 38">
+                  <a:extLst>
+                    <a:ext uri="{FF2B5EF4-FFF2-40B4-BE49-F238E27FC236}">
+                      <a16:creationId xmlns:a16="http://schemas.microsoft.com/office/drawing/2014/main" id="{780461AF-FA46-44BE-8256-30B036CFEF5A}"/>
+                    </a:ext>
+                  </a:extLst>
+                </p:cNvPr>
+                <p:cNvSpPr txBox="1"/>
+                <p:nvPr/>
+              </p:nvSpPr>
+              <p:spPr>
+                <a:xfrm>
+                  <a:off x="9106667" y="2050036"/>
+                  <a:ext cx="454276" cy="338554"/>
+                </a:xfrm>
+                <a:prstGeom prst="rect">
+                  <a:avLst/>
+                </a:prstGeom>
+                <a:noFill/>
+              </p:spPr>
+              <p:txBody>
+                <a:bodyPr wrap="square" rtlCol="0">
+                  <a:spAutoFit/>
+                </a:bodyPr>
+                <a:lstStyle/>
+                <a:p>
+                  <a14:m>
+                    <m:oMathPara xmlns:m="http://schemas.openxmlformats.org/officeDocument/2006/math">
+                      <m:oMathParaPr>
+                        <m:jc m:val="centerGroup"/>
+                      </m:oMathParaPr>
+                      <m:oMath xmlns:m="http://schemas.openxmlformats.org/officeDocument/2006/math">
+                        <m:sSub>
+                          <m:sSubPr>
+                            <m:ctrlPr>
+                              <a:rPr lang="en-US" sz="1600" i="1" smtClean="0">
+                                <a:latin typeface="Cambria Math" panose="02040503050406030204" pitchFamily="18" charset="0"/>
+                              </a:rPr>
+                            </m:ctrlPr>
+                          </m:sSubPr>
+                          <m:e>
+                            <m:r>
+                              <a:rPr lang="en-US" sz="1600" b="0" i="1" smtClean="0">
+                                <a:latin typeface="Cambria Math" panose="02040503050406030204" pitchFamily="18" charset="0"/>
+                              </a:rPr>
+                              <m:t>𝐵</m:t>
+                            </m:r>
+                          </m:e>
+                          <m:sub>
+                            <m:r>
+                              <a:rPr lang="en-US" sz="1600" b="0" i="1" smtClean="0">
+                                <a:latin typeface="Cambria Math" panose="02040503050406030204" pitchFamily="18" charset="0"/>
+                              </a:rPr>
+                              <m:t>3</m:t>
+                            </m:r>
+                          </m:sub>
+                        </m:sSub>
+                      </m:oMath>
+                    </m:oMathPara>
+                  </a14:m>
+                  <a:endParaRPr lang="en-US" dirty="0"/>
+                </a:p>
+              </p:txBody>
+            </p:sp>
+          </mc:Choice>
+          <mc:Fallback>
+            <p:sp>
+              <p:nvSpPr>
+                <p:cNvPr id="39" name="TextBox 38">
+                  <a:extLst>
+                    <a:ext uri="{FF2B5EF4-FFF2-40B4-BE49-F238E27FC236}">
+                      <a16:creationId xmlns:a16="http://schemas.microsoft.com/office/drawing/2014/main" id="{780461AF-FA46-44BE-8256-30B036CFEF5A}"/>
+                    </a:ext>
+                  </a:extLst>
+                </p:cNvPr>
+                <p:cNvSpPr txBox="1">
+                  <a:spLocks noRot="1" noChangeAspect="1" noMove="1" noResize="1" noEditPoints="1" noAdjustHandles="1" noChangeArrowheads="1" noChangeShapeType="1" noTextEdit="1"/>
+                </p:cNvSpPr>
+                <p:nvPr/>
+              </p:nvSpPr>
+              <p:spPr>
+                <a:xfrm>
+                  <a:off x="9106667" y="2050036"/>
+                  <a:ext cx="454276" cy="338554"/>
+                </a:xfrm>
+                <a:prstGeom prst="rect">
+                  <a:avLst/>
+                </a:prstGeom>
+                <a:blipFill>
+                  <a:blip r:embed="rId12"/>
+                  <a:stretch>
+                    <a:fillRect/>
+                  </a:stretch>
+                </a:blipFill>
+              </p:spPr>
+              <p:txBody>
+                <a:bodyPr/>
+                <a:lstStyle/>
+                <a:p>
+                  <a:r>
+                    <a:rPr lang="en-US">
+                      <a:noFill/>
+                    </a:rPr>
+                    <a:t> </a:t>
+                  </a:r>
+                </a:p>
+              </p:txBody>
+            </p:sp>
+          </mc:Fallback>
+        </mc:AlternateContent>
+      </p:grpSp>
+      <p:cxnSp>
+        <p:nvCxnSpPr>
+          <p:cNvPr id="40" name="Straight Arrow Connector 39">
+            <a:extLst>
+              <a:ext uri="{FF2B5EF4-FFF2-40B4-BE49-F238E27FC236}">
+                <a16:creationId xmlns:a16="http://schemas.microsoft.com/office/drawing/2014/main" id="{29349795-D386-4373-AFA5-93C76D37ADFB}"/>
+              </a:ext>
+            </a:extLst>
+          </p:cNvPr>
+          <p:cNvCxnSpPr>
+            <a:cxnSpLocks/>
+          </p:cNvCxnSpPr>
+          <p:nvPr/>
+        </p:nvCxnSpPr>
+        <p:spPr>
+          <a:xfrm>
+            <a:off x="7792404" y="2756882"/>
+            <a:ext cx="599600" cy="1084868"/>
+          </a:xfrm>
+          <a:prstGeom prst="straightConnector1">
+            <a:avLst/>
+          </a:prstGeom>
+          <a:ln w="38100">
+            <a:headEnd type="triangle"/>
+            <a:tailEnd type="triangle"/>
+          </a:ln>
+        </p:spPr>
+        <p:style>
+          <a:lnRef idx="1">
+            <a:schemeClr val="dk1"/>
+          </a:lnRef>
+          <a:fillRef idx="0">
+            <a:schemeClr val="dk1"/>
+          </a:fillRef>
+          <a:effectRef idx="0">
+            <a:schemeClr val="dk1"/>
+          </a:effectRef>
+          <a:fontRef idx="minor">
+            <a:schemeClr val="tx1"/>
+          </a:fontRef>
+        </p:style>
+      </p:cxnSp>
+      <p:cxnSp>
+        <p:nvCxnSpPr>
+          <p:cNvPr id="43" name="Straight Arrow Connector 42">
+            <a:extLst>
+              <a:ext uri="{FF2B5EF4-FFF2-40B4-BE49-F238E27FC236}">
+                <a16:creationId xmlns:a16="http://schemas.microsoft.com/office/drawing/2014/main" id="{BDA54CE1-7F31-44E9-8463-7C32002CB193}"/>
+              </a:ext>
+            </a:extLst>
+          </p:cNvPr>
+          <p:cNvCxnSpPr>
+            <a:cxnSpLocks/>
+          </p:cNvCxnSpPr>
+          <p:nvPr/>
+        </p:nvCxnSpPr>
+        <p:spPr>
+          <a:xfrm>
+            <a:off x="7027412" y="3136718"/>
+            <a:ext cx="1219122" cy="705032"/>
+          </a:xfrm>
+          <a:prstGeom prst="straightConnector1">
+            <a:avLst/>
+          </a:prstGeom>
+          <a:ln w="38100">
+            <a:headEnd type="triangle"/>
+            <a:tailEnd type="triangle"/>
+          </a:ln>
+        </p:spPr>
+        <p:style>
+          <a:lnRef idx="1">
+            <a:schemeClr val="dk1"/>
+          </a:lnRef>
+          <a:fillRef idx="0">
+            <a:schemeClr val="dk1"/>
+          </a:fillRef>
+          <a:effectRef idx="0">
+            <a:schemeClr val="dk1"/>
+          </a:effectRef>
+          <a:fontRef idx="minor">
+            <a:schemeClr val="tx1"/>
+          </a:fontRef>
+        </p:style>
+      </p:cxnSp>
+      <p:cxnSp>
+        <p:nvCxnSpPr>
+          <p:cNvPr id="45" name="Straight Arrow Connector 44">
+            <a:extLst>
+              <a:ext uri="{FF2B5EF4-FFF2-40B4-BE49-F238E27FC236}">
+                <a16:creationId xmlns:a16="http://schemas.microsoft.com/office/drawing/2014/main" id="{CDD0788C-00A3-44ED-BFD6-0A2BCE916157}"/>
+              </a:ext>
+            </a:extLst>
+          </p:cNvPr>
+          <p:cNvCxnSpPr>
+            <a:cxnSpLocks/>
+          </p:cNvCxnSpPr>
+          <p:nvPr/>
+        </p:nvCxnSpPr>
+        <p:spPr>
+          <a:xfrm flipH="1" flipV="1">
+            <a:off x="6570172" y="4108432"/>
+            <a:ext cx="1676362" cy="327017"/>
+          </a:xfrm>
+          <a:prstGeom prst="straightConnector1">
+            <a:avLst/>
+          </a:prstGeom>
+          <a:ln w="38100">
+            <a:headEnd type="triangle"/>
+            <a:tailEnd type="triangle"/>
+          </a:ln>
+        </p:spPr>
+        <p:style>
+          <a:lnRef idx="1">
+            <a:schemeClr val="dk1"/>
+          </a:lnRef>
+          <a:fillRef idx="0">
+            <a:schemeClr val="dk1"/>
+          </a:fillRef>
+          <a:effectRef idx="0">
+            <a:schemeClr val="dk1"/>
+          </a:effectRef>
+          <a:fontRef idx="minor">
+            <a:schemeClr val="tx1"/>
+          </a:fontRef>
+        </p:style>
+      </p:cxnSp>
+      <p:cxnSp>
+        <p:nvCxnSpPr>
+          <p:cNvPr id="47" name="Straight Arrow Connector 46">
+            <a:extLst>
+              <a:ext uri="{FF2B5EF4-FFF2-40B4-BE49-F238E27FC236}">
+                <a16:creationId xmlns:a16="http://schemas.microsoft.com/office/drawing/2014/main" id="{A192C524-AF90-4537-8D98-AC44D5659858}"/>
+              </a:ext>
+            </a:extLst>
+          </p:cNvPr>
+          <p:cNvCxnSpPr>
+            <a:cxnSpLocks/>
+          </p:cNvCxnSpPr>
+          <p:nvPr/>
+        </p:nvCxnSpPr>
+        <p:spPr>
+          <a:xfrm flipH="1">
+            <a:off x="7076170" y="4564380"/>
+            <a:ext cx="1199126" cy="560195"/>
+          </a:xfrm>
+          <a:prstGeom prst="straightConnector1">
+            <a:avLst/>
+          </a:prstGeom>
+          <a:ln w="38100">
+            <a:headEnd type="triangle"/>
+            <a:tailEnd type="triangle"/>
+          </a:ln>
+        </p:spPr>
+        <p:style>
+          <a:lnRef idx="1">
+            <a:schemeClr val="dk1"/>
+          </a:lnRef>
+          <a:fillRef idx="0">
+            <a:schemeClr val="dk1"/>
+          </a:fillRef>
+          <a:effectRef idx="0">
+            <a:schemeClr val="dk1"/>
+          </a:effectRef>
+          <a:fontRef idx="minor">
+            <a:schemeClr val="tx1"/>
+          </a:fontRef>
+        </p:style>
+      </p:cxnSp>
+      <p:sp>
+        <p:nvSpPr>
+          <p:cNvPr id="55" name="Freeform: Shape 54">
+            <a:extLst>
+              <a:ext uri="{FF2B5EF4-FFF2-40B4-BE49-F238E27FC236}">
+                <a16:creationId xmlns:a16="http://schemas.microsoft.com/office/drawing/2014/main" id="{64876282-A244-4937-B917-25F98CB594FE}"/>
+              </a:ext>
+            </a:extLst>
+          </p:cNvPr>
+          <p:cNvSpPr/>
+          <p:nvPr/>
+        </p:nvSpPr>
+        <p:spPr>
+          <a:xfrm>
+            <a:off x="10012680" y="2065020"/>
+            <a:ext cx="663898" cy="777240"/>
+          </a:xfrm>
+          <a:custGeom>
+            <a:avLst/>
+            <a:gdLst>
+              <a:gd name="connsiteX0" fmla="*/ 0 w 663898"/>
+              <a:gd name="connsiteY0" fmla="*/ 0 h 777240"/>
+              <a:gd name="connsiteX1" fmla="*/ 632460 w 663898"/>
+              <a:gd name="connsiteY1" fmla="*/ 198120 h 777240"/>
+              <a:gd name="connsiteX2" fmla="*/ 510540 w 663898"/>
+              <a:gd name="connsiteY2" fmla="*/ 777240 h 777240"/>
+            </a:gdLst>
+            <a:ahLst/>
+            <a:cxnLst>
+              <a:cxn ang="0">
+                <a:pos x="connsiteX0" y="connsiteY0"/>
+              </a:cxn>
+              <a:cxn ang="0">
+                <a:pos x="connsiteX1" y="connsiteY1"/>
+              </a:cxn>
+              <a:cxn ang="0">
+                <a:pos x="connsiteX2" y="connsiteY2"/>
+              </a:cxn>
+            </a:cxnLst>
+            <a:rect l="l" t="t" r="r" b="b"/>
+            <a:pathLst>
+              <a:path w="663898" h="777240">
+                <a:moveTo>
+                  <a:pt x="0" y="0"/>
+                </a:moveTo>
+                <a:cubicBezTo>
+                  <a:pt x="273685" y="34290"/>
+                  <a:pt x="547370" y="68580"/>
+                  <a:pt x="632460" y="198120"/>
+                </a:cubicBezTo>
+                <a:cubicBezTo>
+                  <a:pt x="717550" y="327660"/>
+                  <a:pt x="614045" y="552450"/>
+                  <a:pt x="510540" y="777240"/>
+                </a:cubicBezTo>
+              </a:path>
+            </a:pathLst>
+          </a:custGeom>
+          <a:ln w="19050">
+            <a:prstDash val="dash"/>
+            <a:headEnd type="triangle" w="med" len="med"/>
+            <a:tailEnd type="triangle" w="med" len="med"/>
+          </a:ln>
+        </p:spPr>
+        <p:style>
+          <a:lnRef idx="1">
+            <a:schemeClr val="dk1"/>
+          </a:lnRef>
+          <a:fillRef idx="0">
+            <a:schemeClr val="dk1"/>
+          </a:fillRef>
+          <a:effectRef idx="0">
+            <a:schemeClr val="dk1"/>
+          </a:effectRef>
+          <a:fontRef idx="minor">
+            <a:schemeClr val="tx1"/>
+          </a:fontRef>
+        </p:style>
+        <p:txBody>
+          <a:bodyPr rtlCol="0" anchor="ctr"/>
+          <a:lstStyle/>
+          <a:p>
+            <a:pPr algn="ctr"/>
+            <a:endParaRPr lang="en-US"/>
+          </a:p>
+        </p:txBody>
+      </p:sp>
+      <p:sp>
+        <p:nvSpPr>
+          <p:cNvPr id="56" name="Freeform: Shape 55">
+            <a:extLst>
+              <a:ext uri="{FF2B5EF4-FFF2-40B4-BE49-F238E27FC236}">
+                <a16:creationId xmlns:a16="http://schemas.microsoft.com/office/drawing/2014/main" id="{AE1C3071-9B5A-41C4-B0B4-60292CF476C1}"/>
+              </a:ext>
+            </a:extLst>
+          </p:cNvPr>
+          <p:cNvSpPr/>
+          <p:nvPr/>
+        </p:nvSpPr>
+        <p:spPr>
+          <a:xfrm rot="16572408">
+            <a:off x="6563575" y="1736526"/>
+            <a:ext cx="663898" cy="777240"/>
+          </a:xfrm>
+          <a:custGeom>
+            <a:avLst/>
+            <a:gdLst>
+              <a:gd name="connsiteX0" fmla="*/ 0 w 663898"/>
+              <a:gd name="connsiteY0" fmla="*/ 0 h 777240"/>
+              <a:gd name="connsiteX1" fmla="*/ 632460 w 663898"/>
+              <a:gd name="connsiteY1" fmla="*/ 198120 h 777240"/>
+              <a:gd name="connsiteX2" fmla="*/ 510540 w 663898"/>
+              <a:gd name="connsiteY2" fmla="*/ 777240 h 777240"/>
+            </a:gdLst>
+            <a:ahLst/>
+            <a:cxnLst>
+              <a:cxn ang="0">
+                <a:pos x="connsiteX0" y="connsiteY0"/>
+              </a:cxn>
+              <a:cxn ang="0">
+                <a:pos x="connsiteX1" y="connsiteY1"/>
+              </a:cxn>
+              <a:cxn ang="0">
+                <a:pos x="connsiteX2" y="connsiteY2"/>
+              </a:cxn>
+            </a:cxnLst>
+            <a:rect l="l" t="t" r="r" b="b"/>
+            <a:pathLst>
+              <a:path w="663898" h="777240">
+                <a:moveTo>
+                  <a:pt x="0" y="0"/>
+                </a:moveTo>
+                <a:cubicBezTo>
+                  <a:pt x="273685" y="34290"/>
+                  <a:pt x="547370" y="68580"/>
+                  <a:pt x="632460" y="198120"/>
+                </a:cubicBezTo>
+                <a:cubicBezTo>
+                  <a:pt x="717550" y="327660"/>
+                  <a:pt x="614045" y="552450"/>
+                  <a:pt x="510540" y="777240"/>
+                </a:cubicBezTo>
+              </a:path>
+            </a:pathLst>
+          </a:custGeom>
+          <a:ln w="19050">
+            <a:prstDash val="dash"/>
+            <a:headEnd type="triangle" w="med" len="med"/>
+            <a:tailEnd type="triangle" w="med" len="med"/>
+          </a:ln>
+        </p:spPr>
+        <p:style>
+          <a:lnRef idx="1">
+            <a:schemeClr val="dk1"/>
+          </a:lnRef>
+          <a:fillRef idx="0">
+            <a:schemeClr val="dk1"/>
+          </a:fillRef>
+          <a:effectRef idx="0">
+            <a:schemeClr val="dk1"/>
+          </a:effectRef>
+          <a:fontRef idx="minor">
+            <a:schemeClr val="tx1"/>
+          </a:fontRef>
+        </p:style>
+        <p:txBody>
+          <a:bodyPr rtlCol="0" anchor="ctr"/>
+          <a:lstStyle/>
+          <a:p>
+            <a:pPr algn="ctr"/>
+            <a:endParaRPr lang="en-US"/>
+          </a:p>
+        </p:txBody>
+      </p:sp>
+      <p:sp>
+        <p:nvSpPr>
+          <p:cNvPr id="57" name="Freeform: Shape 56">
+            <a:extLst>
+              <a:ext uri="{FF2B5EF4-FFF2-40B4-BE49-F238E27FC236}">
+                <a16:creationId xmlns:a16="http://schemas.microsoft.com/office/drawing/2014/main" id="{85315B24-42D8-4559-8460-38C1209D39AB}"/>
+              </a:ext>
+            </a:extLst>
+          </p:cNvPr>
+          <p:cNvSpPr/>
+          <p:nvPr/>
+        </p:nvSpPr>
+        <p:spPr>
+          <a:xfrm rot="11488336">
+            <a:off x="5295591" y="4279441"/>
+            <a:ext cx="663898" cy="777240"/>
+          </a:xfrm>
+          <a:custGeom>
+            <a:avLst/>
+            <a:gdLst>
+              <a:gd name="connsiteX0" fmla="*/ 0 w 663898"/>
+              <a:gd name="connsiteY0" fmla="*/ 0 h 777240"/>
+              <a:gd name="connsiteX1" fmla="*/ 632460 w 663898"/>
+              <a:gd name="connsiteY1" fmla="*/ 198120 h 777240"/>
+              <a:gd name="connsiteX2" fmla="*/ 510540 w 663898"/>
+              <a:gd name="connsiteY2" fmla="*/ 777240 h 777240"/>
+            </a:gdLst>
+            <a:ahLst/>
+            <a:cxnLst>
+              <a:cxn ang="0">
+                <a:pos x="connsiteX0" y="connsiteY0"/>
+              </a:cxn>
+              <a:cxn ang="0">
+                <a:pos x="connsiteX1" y="connsiteY1"/>
+              </a:cxn>
+              <a:cxn ang="0">
+                <a:pos x="connsiteX2" y="connsiteY2"/>
+              </a:cxn>
+            </a:cxnLst>
+            <a:rect l="l" t="t" r="r" b="b"/>
+            <a:pathLst>
+              <a:path w="663898" h="777240">
+                <a:moveTo>
+                  <a:pt x="0" y="0"/>
+                </a:moveTo>
+                <a:cubicBezTo>
+                  <a:pt x="273685" y="34290"/>
+                  <a:pt x="547370" y="68580"/>
+                  <a:pt x="632460" y="198120"/>
+                </a:cubicBezTo>
+                <a:cubicBezTo>
+                  <a:pt x="717550" y="327660"/>
+                  <a:pt x="614045" y="552450"/>
+                  <a:pt x="510540" y="777240"/>
+                </a:cubicBezTo>
+              </a:path>
+            </a:pathLst>
+          </a:custGeom>
+          <a:ln w="19050">
+            <a:prstDash val="dash"/>
+            <a:headEnd type="triangle" w="med" len="med"/>
+            <a:tailEnd type="triangle" w="med" len="med"/>
+          </a:ln>
+        </p:spPr>
+        <p:style>
+          <a:lnRef idx="1">
+            <a:schemeClr val="dk1"/>
+          </a:lnRef>
+          <a:fillRef idx="0">
+            <a:schemeClr val="dk1"/>
+          </a:fillRef>
+          <a:effectRef idx="0">
+            <a:schemeClr val="dk1"/>
+          </a:effectRef>
+          <a:fontRef idx="minor">
+            <a:schemeClr val="tx1"/>
+          </a:fontRef>
+        </p:style>
+        <p:txBody>
+          <a:bodyPr rtlCol="0" anchor="ctr"/>
+          <a:lstStyle/>
+          <a:p>
+            <a:pPr algn="ctr"/>
+            <a:endParaRPr lang="en-US"/>
           </a:p>
         </p:txBody>
       </p:sp>
@@ -3577,6 +5226,18 @@
           <a:bodyPr/>
           <a:lstStyle/>
           <a:p>
+            <a:r>
+              <a:rPr lang="en-US" dirty="0"/>
+              <a:t>Currently we must use a common interface to access the Quantum Computer</a:t>
+            </a:r>
+          </a:p>
+          <a:p>
+            <a:r>
+              <a:rPr lang="en-US" dirty="0"/>
+              <a:t>We must assume the connection between client and Interface is secure, even though it can be classically secure at best</a:t>
+            </a:r>
+          </a:p>
+          <a:p>
             <a:endParaRPr lang="en-US" dirty="0"/>
           </a:p>
         </p:txBody>
@@ -3636,6 +5297,10 @@
               <a:rPr lang="en-US" dirty="0"/>
               <a:t>How does the distribution work?</a:t>
             </a:r>
+            <a:r>
+              <a:rPr lang="en-US" sz="2000" dirty="0"/>
+              <a:t>[2]</a:t>
+            </a:r>
           </a:p>
         </p:txBody>
       </p:sp>
@@ -3657,7 +5322,9 @@
         </p:nvSpPr>
         <p:spPr/>
         <p:txBody>
-          <a:bodyPr/>
+          <a:bodyPr>
+            <a:normAutofit/>
+          </a:bodyPr>
           <a:lstStyle/>
           <a:p>
             <a:pPr marL="514350" indent="-514350">
@@ -3676,7 +5343,57 @@
             </a:pPr>
             <a:r>
               <a:rPr lang="en-US" dirty="0"/>
-              <a:t>Send it </a:t>
+              <a:t>Users send the server basis in which to measure the Bell-State</a:t>
+            </a:r>
+          </a:p>
+          <a:p>
+            <a:pPr marL="514350" indent="-514350">
+              <a:buFont typeface="+mj-lt"/>
+              <a:buAutoNum type="arabicPeriod"/>
+            </a:pPr>
+            <a:r>
+              <a:rPr lang="en-US" dirty="0"/>
+              <a:t>The Results are returned to the corresponding users</a:t>
+            </a:r>
+          </a:p>
+          <a:p>
+            <a:pPr marL="514350" indent="-514350">
+              <a:buFont typeface="+mj-lt"/>
+              <a:buAutoNum type="arabicPeriod"/>
+            </a:pPr>
+            <a:r>
+              <a:rPr lang="en-US" dirty="0"/>
+              <a:t>The Users send each other the used basis (after the measurements have taken place)</a:t>
+            </a:r>
+          </a:p>
+          <a:p>
+            <a:pPr marL="514350" indent="-514350">
+              <a:buFont typeface="+mj-lt"/>
+              <a:buAutoNum type="arabicPeriod"/>
+            </a:pPr>
+            <a:r>
+              <a:rPr lang="en-US" dirty="0"/>
+              <a:t>If they used the same basis, the measure bit is added to the key</a:t>
+            </a:r>
+          </a:p>
+          <a:p>
+            <a:pPr marL="514350" indent="-514350">
+              <a:buFont typeface="+mj-lt"/>
+              <a:buAutoNum type="arabicPeriod"/>
+            </a:pPr>
+            <a:r>
+              <a:rPr lang="en-US" dirty="0"/>
+              <a:t>Otherwise, it is sent to the other user</a:t>
+            </a:r>
+          </a:p>
+          <a:p>
+            <a:pPr marL="514350" indent="-514350">
+              <a:buFont typeface="+mj-lt"/>
+              <a:buAutoNum type="arabicPeriod"/>
+            </a:pPr>
+            <a:r>
+              <a:rPr lang="en-US" dirty="0"/>
+              <a:t>Both users can now use the bits, which aren’t part of the key to validate, whether someone was eavesdropping using Bell’s theorem</a:t>
             </a:r>
           </a:p>
         </p:txBody>
@@ -3739,31 +5456,116 @@
           </a:p>
         </p:txBody>
       </p:sp>
-      <p:sp>
-        <p:nvSpPr>
-          <p:cNvPr id="3" name="Content Placeholder 2">
-            <a:extLst>
-              <a:ext uri="{FF2B5EF4-FFF2-40B4-BE49-F238E27FC236}">
-                <a16:creationId xmlns:a16="http://schemas.microsoft.com/office/drawing/2014/main" id="{FCC6DEA6-F732-4105-BEFE-381267EACE9E}"/>
-              </a:ext>
-            </a:extLst>
-          </p:cNvPr>
-          <p:cNvSpPr>
-            <a:spLocks noGrp="1"/>
-          </p:cNvSpPr>
-          <p:nvPr>
-            <p:ph idx="1"/>
-          </p:nvPr>
-        </p:nvSpPr>
-        <p:spPr/>
-        <p:txBody>
-          <a:bodyPr/>
-          <a:lstStyle/>
-          <a:p>
-            <a:endParaRPr lang="en-US"/>
-          </a:p>
-        </p:txBody>
-      </p:sp>
+      <mc:AlternateContent xmlns:mc="http://schemas.openxmlformats.org/markup-compatibility/2006">
+        <mc:Choice xmlns:a14="http://schemas.microsoft.com/office/drawing/2010/main" Requires="a14">
+          <p:sp>
+            <p:nvSpPr>
+              <p:cNvPr id="3" name="Content Placeholder 2">
+                <a:extLst>
+                  <a:ext uri="{FF2B5EF4-FFF2-40B4-BE49-F238E27FC236}">
+                    <a16:creationId xmlns:a16="http://schemas.microsoft.com/office/drawing/2014/main" id="{FCC6DEA6-F732-4105-BEFE-381267EACE9E}"/>
+                  </a:ext>
+                </a:extLst>
+              </p:cNvPr>
+              <p:cNvSpPr>
+                <a:spLocks noGrp="1"/>
+              </p:cNvSpPr>
+              <p:nvPr>
+                <p:ph idx="1"/>
+              </p:nvPr>
+            </p:nvSpPr>
+            <p:spPr/>
+            <p:txBody>
+              <a:bodyPr/>
+              <a:lstStyle/>
+              <a:p>
+                <a:r>
+                  <a:rPr lang="en-US" dirty="0"/>
+                  <a:t>Usually less frequently used, because challenge of transporting the Bell Pair</a:t>
+                </a:r>
+              </a:p>
+              <a:p>
+                <a:r>
+                  <a:rPr lang="en-US" dirty="0"/>
+                  <a:t>Since we don’t need to transport the pair anyway, using E91 becomes easier</a:t>
+                </a:r>
+              </a:p>
+              <a:p>
+                <a:r>
+                  <a:rPr lang="en-US" dirty="0"/>
+                  <a:t>Fault tolerant until an error of </a:t>
+                </a:r>
+                <a14:m>
+                  <m:oMath xmlns:m="http://schemas.openxmlformats.org/officeDocument/2006/math">
+                    <m:r>
+                      <a:rPr lang="en-US" i="1" smtClean="0">
+                        <a:latin typeface="Cambria Math" panose="02040503050406030204" pitchFamily="18" charset="0"/>
+                        <a:ea typeface="Cambria Math" panose="02040503050406030204" pitchFamily="18" charset="0"/>
+                      </a:rPr>
+                      <m:t>𝜀</m:t>
+                    </m:r>
+                    <m:r>
+                      <a:rPr lang="en-US" b="0" i="1" smtClean="0">
+                        <a:latin typeface="Cambria Math" panose="02040503050406030204" pitchFamily="18" charset="0"/>
+                        <a:ea typeface="Cambria Math" panose="02040503050406030204" pitchFamily="18" charset="0"/>
+                      </a:rPr>
+                      <m:t>=0.61</m:t>
+                    </m:r>
+                  </m:oMath>
+                </a14:m>
+                <a:r>
+                  <a:rPr lang="en-US" dirty="0"/>
+                  <a:t> in a collective-rotation noise channel</a:t>
+                </a:r>
+                <a:r>
+                  <a:rPr lang="en-US" sz="1100" dirty="0"/>
+                  <a:t>[2]</a:t>
+                </a:r>
+                <a:endParaRPr lang="en-US" dirty="0"/>
+              </a:p>
+            </p:txBody>
+          </p:sp>
+        </mc:Choice>
+        <mc:Fallback>
+          <p:sp>
+            <p:nvSpPr>
+              <p:cNvPr id="3" name="Content Placeholder 2">
+                <a:extLst>
+                  <a:ext uri="{FF2B5EF4-FFF2-40B4-BE49-F238E27FC236}">
+                    <a16:creationId xmlns:a16="http://schemas.microsoft.com/office/drawing/2014/main" id="{FCC6DEA6-F732-4105-BEFE-381267EACE9E}"/>
+                  </a:ext>
+                </a:extLst>
+              </p:cNvPr>
+              <p:cNvSpPr>
+                <a:spLocks noGrp="1" noRot="1" noChangeAspect="1" noMove="1" noResize="1" noEditPoints="1" noAdjustHandles="1" noChangeArrowheads="1" noChangeShapeType="1" noTextEdit="1"/>
+              </p:cNvSpPr>
+              <p:nvPr>
+                <p:ph idx="1"/>
+              </p:nvPr>
+            </p:nvSpPr>
+            <p:spPr>
+              <a:blipFill>
+                <a:blip r:embed="rId2"/>
+                <a:stretch>
+                  <a:fillRect l="-1043" t="-2241" r="-1101"/>
+                </a:stretch>
+              </a:blipFill>
+            </p:spPr>
+            <p:txBody>
+              <a:bodyPr/>
+              <a:lstStyle/>
+              <a:p>
+                <a:r>
+                  <a:rPr lang="en-US">
+                    <a:noFill/>
+                  </a:rPr>
+                  <a:t> </a:t>
+                </a:r>
+              </a:p>
+            </p:txBody>
+          </p:sp>
+        </mc:Fallback>
+      </mc:AlternateContent>
     </p:spTree>
     <p:extLst>
       <p:ext uri="{BB962C8B-B14F-4D97-AF65-F5344CB8AC3E}">
@@ -3799,7 +5601,7 @@
           <p:cNvPr id="2" name="Title 1">
             <a:extLst>
               <a:ext uri="{FF2B5EF4-FFF2-40B4-BE49-F238E27FC236}">
-                <a16:creationId xmlns:a16="http://schemas.microsoft.com/office/drawing/2014/main" id="{F1757889-242B-47B1-B9A0-E5820DE47668}"/>
+                <a16:creationId xmlns:a16="http://schemas.microsoft.com/office/drawing/2014/main" id="{DC969B94-28E6-45BC-BF61-94C78F315F5D}"/>
               </a:ext>
             </a:extLst>
           </p:cNvPr>
@@ -3817,7 +5619,7 @@
           <a:p>
             <a:r>
               <a:rPr lang="en-US" dirty="0"/>
-              <a:t>Analysis</a:t>
+              <a:t>Problems faced</a:t>
             </a:r>
           </a:p>
         </p:txBody>
@@ -3827,7 +5629,7 @@
           <p:cNvPr id="3" name="Content Placeholder 2">
             <a:extLst>
               <a:ext uri="{FF2B5EF4-FFF2-40B4-BE49-F238E27FC236}">
-                <a16:creationId xmlns:a16="http://schemas.microsoft.com/office/drawing/2014/main" id="{E2792EEB-3350-4C2C-930D-0E5433756280}"/>
+                <a16:creationId xmlns:a16="http://schemas.microsoft.com/office/drawing/2014/main" id="{2DCDA376-5C8B-4D14-A46A-DB315C55748B}"/>
               </a:ext>
             </a:extLst>
           </p:cNvPr>
@@ -3850,7 +5652,7 @@
     </p:spTree>
     <p:extLst>
       <p:ext uri="{BB962C8B-B14F-4D97-AF65-F5344CB8AC3E}">
-        <p14:creationId xmlns:p14="http://schemas.microsoft.com/office/powerpoint/2010/main" val="321253503"/>
+        <p14:creationId xmlns:p14="http://schemas.microsoft.com/office/powerpoint/2010/main" val="4230175073"/>
       </p:ext>
     </p:extLst>
   </p:cSld>
@@ -3882,6 +5684,89 @@
           <p:cNvPr id="2" name="Title 1">
             <a:extLst>
               <a:ext uri="{FF2B5EF4-FFF2-40B4-BE49-F238E27FC236}">
+                <a16:creationId xmlns:a16="http://schemas.microsoft.com/office/drawing/2014/main" id="{F1757889-242B-47B1-B9A0-E5820DE47668}"/>
+              </a:ext>
+            </a:extLst>
+          </p:cNvPr>
+          <p:cNvSpPr>
+            <a:spLocks noGrp="1"/>
+          </p:cNvSpPr>
+          <p:nvPr>
+            <p:ph type="title"/>
+          </p:nvPr>
+        </p:nvSpPr>
+        <p:spPr/>
+        <p:txBody>
+          <a:bodyPr/>
+          <a:lstStyle/>
+          <a:p>
+            <a:r>
+              <a:rPr lang="en-US" dirty="0"/>
+              <a:t>Analysis</a:t>
+            </a:r>
+          </a:p>
+        </p:txBody>
+      </p:sp>
+      <p:sp>
+        <p:nvSpPr>
+          <p:cNvPr id="3" name="Content Placeholder 2">
+            <a:extLst>
+              <a:ext uri="{FF2B5EF4-FFF2-40B4-BE49-F238E27FC236}">
+                <a16:creationId xmlns:a16="http://schemas.microsoft.com/office/drawing/2014/main" id="{E2792EEB-3350-4C2C-930D-0E5433756280}"/>
+              </a:ext>
+            </a:extLst>
+          </p:cNvPr>
+          <p:cNvSpPr>
+            <a:spLocks noGrp="1"/>
+          </p:cNvSpPr>
+          <p:nvPr>
+            <p:ph idx="1"/>
+          </p:nvPr>
+        </p:nvSpPr>
+        <p:spPr/>
+        <p:txBody>
+          <a:bodyPr/>
+          <a:lstStyle/>
+          <a:p>
+            <a:endParaRPr lang="en-US" dirty="0"/>
+          </a:p>
+        </p:txBody>
+      </p:sp>
+    </p:spTree>
+    <p:extLst>
+      <p:ext uri="{BB962C8B-B14F-4D97-AF65-F5344CB8AC3E}">
+        <p14:creationId xmlns:p14="http://schemas.microsoft.com/office/powerpoint/2010/main" val="321253503"/>
+      </p:ext>
+    </p:extLst>
+  </p:cSld>
+  <p:clrMapOvr>
+    <a:masterClrMapping/>
+  </p:clrMapOvr>
+</p:sld>
+</file>
+
+<file path=ppt/slides/slide8.xml><?xml version="1.0" encoding="utf-8"?>
+<p:sld xmlns:a="http://schemas.openxmlformats.org/drawingml/2006/main" xmlns:r="http://schemas.openxmlformats.org/officeDocument/2006/relationships" xmlns:p="http://schemas.openxmlformats.org/presentationml/2006/main">
+  <p:cSld>
+    <p:spTree>
+      <p:nvGrpSpPr>
+        <p:cNvPr id="1" name=""/>
+        <p:cNvGrpSpPr/>
+        <p:nvPr/>
+      </p:nvGrpSpPr>
+      <p:grpSpPr>
+        <a:xfrm>
+          <a:off x="0" y="0"/>
+          <a:ext cx="0" cy="0"/>
+          <a:chOff x="0" y="0"/>
+          <a:chExt cx="0" cy="0"/>
+        </a:xfrm>
+      </p:grpSpPr>
+      <p:sp>
+        <p:nvSpPr>
+          <p:cNvPr id="2" name="Title 1">
+            <a:extLst>
+              <a:ext uri="{FF2B5EF4-FFF2-40B4-BE49-F238E27FC236}">
                 <a16:creationId xmlns:a16="http://schemas.microsoft.com/office/drawing/2014/main" id="{FA7227B2-F95A-4E4E-9ACF-17914F319CCE}"/>
               </a:ext>
             </a:extLst>
@@ -3934,6 +5819,112 @@
     <p:extLst>
       <p:ext uri="{BB962C8B-B14F-4D97-AF65-F5344CB8AC3E}">
         <p14:creationId xmlns:p14="http://schemas.microsoft.com/office/powerpoint/2010/main" val="2028985086"/>
+      </p:ext>
+    </p:extLst>
+  </p:cSld>
+  <p:clrMapOvr>
+    <a:masterClrMapping/>
+  </p:clrMapOvr>
+</p:sld>
+</file>
+
+<file path=ppt/slides/slide9.xml><?xml version="1.0" encoding="utf-8"?>
+<p:sld xmlns:a="http://schemas.openxmlformats.org/drawingml/2006/main" xmlns:r="http://schemas.openxmlformats.org/officeDocument/2006/relationships" xmlns:p="http://schemas.openxmlformats.org/presentationml/2006/main">
+  <p:cSld>
+    <p:spTree>
+      <p:nvGrpSpPr>
+        <p:cNvPr id="1" name=""/>
+        <p:cNvGrpSpPr/>
+        <p:nvPr/>
+      </p:nvGrpSpPr>
+      <p:grpSpPr>
+        <a:xfrm>
+          <a:off x="0" y="0"/>
+          <a:ext cx="0" cy="0"/>
+          <a:chOff x="0" y="0"/>
+          <a:chExt cx="0" cy="0"/>
+        </a:xfrm>
+      </p:grpSpPr>
+      <p:sp>
+        <p:nvSpPr>
+          <p:cNvPr id="2" name="Title 1">
+            <a:extLst>
+              <a:ext uri="{FF2B5EF4-FFF2-40B4-BE49-F238E27FC236}">
+                <a16:creationId xmlns:a16="http://schemas.microsoft.com/office/drawing/2014/main" id="{8B787CE0-213D-4F47-AD62-77523FADDCEB}"/>
+              </a:ext>
+            </a:extLst>
+          </p:cNvPr>
+          <p:cNvSpPr>
+            <a:spLocks noGrp="1"/>
+          </p:cNvSpPr>
+          <p:nvPr>
+            <p:ph type="title"/>
+          </p:nvPr>
+        </p:nvSpPr>
+        <p:spPr/>
+        <p:txBody>
+          <a:bodyPr/>
+          <a:lstStyle/>
+          <a:p>
+            <a:r>
+              <a:rPr lang="en-US" dirty="0"/>
+              <a:t>Sources</a:t>
+            </a:r>
+          </a:p>
+        </p:txBody>
+      </p:sp>
+      <p:sp>
+        <p:nvSpPr>
+          <p:cNvPr id="3" name="Content Placeholder 2">
+            <a:extLst>
+              <a:ext uri="{FF2B5EF4-FFF2-40B4-BE49-F238E27FC236}">
+                <a16:creationId xmlns:a16="http://schemas.microsoft.com/office/drawing/2014/main" id="{E878FBB3-F7D4-49E2-9788-2D1EE5DCE95E}"/>
+              </a:ext>
+            </a:extLst>
+          </p:cNvPr>
+          <p:cNvSpPr>
+            <a:spLocks noGrp="1"/>
+          </p:cNvSpPr>
+          <p:nvPr>
+            <p:ph idx="1"/>
+          </p:nvPr>
+        </p:nvSpPr>
+        <p:spPr/>
+        <p:txBody>
+          <a:bodyPr/>
+          <a:lstStyle/>
+          <a:p>
+            <a:pPr marL="0" indent="0">
+              <a:buNone/>
+            </a:pPr>
+            <a:r>
+              <a:rPr lang="en-US" dirty="0"/>
+              <a:t>[1]: </a:t>
+            </a:r>
+            <a:r>
+              <a:rPr lang="en-US" dirty="0" err="1"/>
+              <a:t>Ekert</a:t>
+            </a:r>
+            <a:r>
+              <a:rPr lang="en-US" dirty="0"/>
+              <a:t> AK. Quantum cryptography based on Bell’s theorem. Phys Rev Lett 1991; 67(6): 661.</a:t>
+            </a:r>
+          </a:p>
+          <a:p>
+            <a:pPr marL="0" indent="0">
+              <a:buNone/>
+            </a:pPr>
+            <a:r>
+              <a:rPr lang="en-US" dirty="0"/>
+              <a:t>[2]: Li L, Li H Chen X, Chang Y, Yang Y and Li Jian. The security analysis of E91 in collective-rotation noise channel. International Journal of Distributed Sensor Networks 2018, Vol. 14.</a:t>
+            </a:r>
+          </a:p>
+        </p:txBody>
+      </p:sp>
+    </p:spTree>
+    <p:extLst>
+      <p:ext uri="{BB962C8B-B14F-4D97-AF65-F5344CB8AC3E}">
+        <p14:creationId xmlns:p14="http://schemas.microsoft.com/office/powerpoint/2010/main" val="3796309735"/>
       </p:ext>
     </p:extLst>
   </p:cSld>

</xml_diff>

<commit_message>
Update E91 Quantum Key Distribution Network.pptx
</commit_message>
<xml_diff>
--- a/E91 Quantum Key Distribution Network.pptx
+++ b/E91 Quantum Key Distribution Network.pptx
@@ -3463,7 +3463,7 @@
         </p:nvSpPr>
         <p:spPr>
           <a:xfrm>
-            <a:off x="9795933" y="4711132"/>
+            <a:off x="6739151" y="3866417"/>
             <a:ext cx="3412067" cy="2832668"/>
           </a:xfrm>
           <a:prstGeom prst="cloudCallout">
@@ -3494,7 +3494,7 @@
           <a:lstStyle/>
           <a:p>
             <a:pPr algn="ctr"/>
-            <a:endParaRPr lang="en-US"/>
+            <a:endParaRPr lang="en-US" dirty="0"/>
           </a:p>
         </p:txBody>
       </p:sp>
@@ -3514,7 +3514,12 @@
             <p:ph type="title"/>
           </p:nvPr>
         </p:nvSpPr>
-        <p:spPr/>
+        <p:spPr>
+          <a:xfrm>
+            <a:off x="821457" y="194848"/>
+            <a:ext cx="10515600" cy="1325563"/>
+          </a:xfrm>
+        </p:spPr>
         <p:txBody>
           <a:bodyPr/>
           <a:lstStyle/>
@@ -3557,7 +3562,7 @@
         </p:blipFill>
         <p:spPr>
           <a:xfrm>
-            <a:off x="8246534" y="3796732"/>
+            <a:off x="4993380" y="3564017"/>
             <a:ext cx="914400" cy="914400"/>
           </a:xfrm>
           <a:prstGeom prst="rect">
@@ -3596,7 +3601,7 @@
         </p:blipFill>
         <p:spPr>
           <a:xfrm>
-            <a:off x="10439400" y="5058266"/>
+            <a:off x="7186246" y="4825551"/>
             <a:ext cx="914400" cy="914400"/>
           </a:xfrm>
           <a:prstGeom prst="rect">
@@ -3620,7 +3625,7 @@
         </p:nvCxnSpPr>
         <p:spPr>
           <a:xfrm>
-            <a:off x="9106667" y="4463551"/>
+            <a:off x="5853513" y="4230836"/>
             <a:ext cx="1254799" cy="721716"/>
           </a:xfrm>
           <a:prstGeom prst="straightConnector1">
@@ -3665,7 +3670,7 @@
         </p:nvCxnSpPr>
         <p:spPr>
           <a:xfrm flipV="1">
-            <a:off x="9077074" y="3387688"/>
+            <a:off x="5823920" y="3154973"/>
             <a:ext cx="781472" cy="531254"/>
           </a:xfrm>
           <a:prstGeom prst="straightConnector1">
@@ -3707,7 +3712,7 @@
         </p:nvCxnSpPr>
         <p:spPr>
           <a:xfrm flipH="1">
-            <a:off x="9008454" y="2722543"/>
+            <a:off x="5755300" y="2489828"/>
             <a:ext cx="68620" cy="1119207"/>
           </a:xfrm>
           <a:prstGeom prst="straightConnector1">
@@ -3747,7 +3752,7 @@
         </p:nvGrpSpPr>
         <p:grpSpPr>
           <a:xfrm>
-            <a:off x="9008454" y="1829230"/>
+            <a:off x="5755300" y="1596515"/>
             <a:ext cx="914479" cy="914479"/>
             <a:chOff x="9008454" y="1829230"/>
             <a:chExt cx="914479" cy="914479"/>
@@ -3913,7 +3918,7 @@
         </p:nvGrpSpPr>
         <p:grpSpPr>
           <a:xfrm>
-            <a:off x="9871246" y="2756882"/>
+            <a:off x="6618092" y="2524167"/>
             <a:ext cx="914479" cy="914479"/>
             <a:chOff x="9008454" y="1829230"/>
             <a:chExt cx="914479" cy="914479"/>
@@ -4079,7 +4084,7 @@
         </p:nvGrpSpPr>
         <p:grpSpPr>
           <a:xfrm>
-            <a:off x="7172882" y="1931350"/>
+            <a:off x="3919728" y="1698635"/>
             <a:ext cx="914479" cy="914479"/>
             <a:chOff x="9008454" y="1829230"/>
             <a:chExt cx="914479" cy="914479"/>
@@ -4245,7 +4250,7 @@
         </p:nvGrpSpPr>
         <p:grpSpPr>
           <a:xfrm>
-            <a:off x="6112933" y="2286430"/>
+            <a:off x="2859779" y="2053715"/>
             <a:ext cx="914479" cy="914479"/>
             <a:chOff x="9008454" y="1829230"/>
             <a:chExt cx="914479" cy="914479"/>
@@ -4411,7 +4416,7 @@
         </p:nvGrpSpPr>
         <p:grpSpPr>
           <a:xfrm>
-            <a:off x="5597465" y="3549072"/>
+            <a:off x="2344311" y="3316357"/>
             <a:ext cx="914479" cy="914479"/>
             <a:chOff x="9008454" y="1829230"/>
             <a:chExt cx="914479" cy="914479"/>
@@ -4577,7 +4582,7 @@
         </p:nvGrpSpPr>
         <p:grpSpPr>
           <a:xfrm>
-            <a:off x="5981044" y="4668062"/>
+            <a:off x="2727890" y="4435347"/>
             <a:ext cx="914479" cy="914479"/>
             <a:chOff x="9008454" y="1829230"/>
             <a:chExt cx="914479" cy="914479"/>
@@ -4745,7 +4750,7 @@
         </p:nvCxnSpPr>
         <p:spPr>
           <a:xfrm>
-            <a:off x="7792404" y="2756882"/>
+            <a:off x="4539250" y="2524167"/>
             <a:ext cx="599600" cy="1084868"/>
           </a:xfrm>
           <a:prstGeom prst="straightConnector1">
@@ -4787,7 +4792,7 @@
         </p:nvCxnSpPr>
         <p:spPr>
           <a:xfrm>
-            <a:off x="7027412" y="3136718"/>
+            <a:off x="3774258" y="2904003"/>
             <a:ext cx="1219122" cy="705032"/>
           </a:xfrm>
           <a:prstGeom prst="straightConnector1">
@@ -4829,7 +4834,7 @@
         </p:nvCxnSpPr>
         <p:spPr>
           <a:xfrm flipH="1" flipV="1">
-            <a:off x="6570172" y="4108432"/>
+            <a:off x="3317018" y="3875717"/>
             <a:ext cx="1676362" cy="327017"/>
           </a:xfrm>
           <a:prstGeom prst="straightConnector1">
@@ -4871,7 +4876,7 @@
         </p:nvCxnSpPr>
         <p:spPr>
           <a:xfrm flipH="1">
-            <a:off x="7076170" y="4564380"/>
+            <a:off x="3823016" y="4331665"/>
             <a:ext cx="1199126" cy="560195"/>
           </a:xfrm>
           <a:prstGeom prst="straightConnector1">
@@ -4911,7 +4916,7 @@
         </p:nvSpPr>
         <p:spPr>
           <a:xfrm>
-            <a:off x="10012680" y="2065020"/>
+            <a:off x="6759526" y="1832305"/>
             <a:ext cx="663898" cy="777240"/>
           </a:xfrm>
           <a:custGeom>
@@ -4998,7 +5003,7 @@
         </p:nvSpPr>
         <p:spPr>
           <a:xfrm rot="16572408">
-            <a:off x="6563575" y="1736526"/>
+            <a:off x="3310421" y="1503811"/>
             <a:ext cx="663898" cy="777240"/>
           </a:xfrm>
           <a:custGeom>
@@ -5085,7 +5090,7 @@
         </p:nvSpPr>
         <p:spPr>
           <a:xfrm rot="11488336">
-            <a:off x="5295591" y="4279441"/>
+            <a:off x="2042437" y="4046726"/>
             <a:ext cx="663898" cy="777240"/>
           </a:xfrm>
           <a:custGeom>
@@ -5475,7 +5480,7 @@
             </a:pPr>
             <a:r>
               <a:rPr lang="en-US" dirty="0"/>
-              <a:t>Two Users establish a connection with the server</a:t>
+              <a:t>Two Users establish a connection with the interface server</a:t>
             </a:r>
           </a:p>
           <a:p>
@@ -6317,7 +6322,7 @@
           <a:p>
             <a:r>
               <a:rPr lang="en-US" dirty="0"/>
-              <a:t>Problems faced</a:t>
+              <a:t>Limitation and Circumvention</a:t>
             </a:r>
           </a:p>
         </p:txBody>
@@ -6343,7 +6348,24 @@
           <a:bodyPr/>
           <a:lstStyle/>
           <a:p>
-            <a:endParaRPr lang="en-US" dirty="0"/>
+            <a:r>
+              <a:rPr lang="en-US" dirty="0"/>
+              <a:t>Lack of Quantum Channel	</a:t>
+            </a:r>
+          </a:p>
+          <a:p>
+            <a:pPr lvl="1"/>
+            <a:r>
+              <a:rPr lang="en-US" dirty="0"/>
+              <a:t>Quantum Key Distribution use of quantum channel to transport qubits from different users</a:t>
+            </a:r>
+          </a:p>
+          <a:p>
+            <a:pPr lvl="1"/>
+            <a:r>
+              <a:rPr lang="en-US" dirty="0"/>
+              <a:t>Assumption on Quantum Channel</a:t>
+            </a:r>
           </a:p>
         </p:txBody>
       </p:sp>
@@ -6509,7 +6531,43 @@
           <a:bodyPr/>
           <a:lstStyle/>
           <a:p>
-            <a:endParaRPr lang="en-US" dirty="0"/>
+            <a:r>
+              <a:rPr lang="en-US" dirty="0"/>
+              <a:t>Interface Server was implemented using Python’s Socket</a:t>
+            </a:r>
+          </a:p>
+          <a:p>
+            <a:r>
+              <a:rPr lang="en-US" dirty="0"/>
+              <a:t>Interface Server communication</a:t>
+            </a:r>
+          </a:p>
+          <a:p>
+            <a:r>
+              <a:rPr lang="en-US" dirty="0"/>
+              <a:t>GUI is developed </a:t>
+            </a:r>
+          </a:p>
+          <a:p>
+            <a:pPr lvl="1"/>
+            <a:r>
+              <a:rPr lang="en-US" dirty="0"/>
+              <a:t>Can list the current computers on the network</a:t>
+            </a:r>
+          </a:p>
+          <a:p>
+            <a:pPr lvl="1"/>
+            <a:r>
+              <a:rPr lang="en-US" dirty="0"/>
+              <a:t>User get to request other users for pairing</a:t>
+            </a:r>
+          </a:p>
+          <a:p>
+            <a:pPr lvl="1"/>
+            <a:r>
+              <a:rPr lang="en-US" dirty="0"/>
+              <a:t>After pairing, the pair can request key by sending the basis</a:t>
+            </a:r>
           </a:p>
         </p:txBody>
       </p:sp>

</xml_diff>

<commit_message>
further work on PPT
</commit_message>
<xml_diff>
--- a/E91 Quantum Key Distribution Network.pptx
+++ b/E91 Quantum Key Distribution Network.pptx
@@ -6367,6 +6367,37 @@
               <a:t>Assumption on Quantum Channel</a:t>
             </a:r>
           </a:p>
+          <a:p>
+            <a:r>
+              <a:rPr lang="en-US" dirty="0"/>
+              <a:t>No multiple measurements in one circuit –&gt; every potential key bit is a new experiment</a:t>
+            </a:r>
+          </a:p>
+          <a:p>
+            <a:pPr lvl="1"/>
+            <a:r>
+              <a:rPr lang="en-US" dirty="0"/>
+              <a:t>Very slow</a:t>
+            </a:r>
+          </a:p>
+          <a:p>
+            <a:pPr lvl="1"/>
+            <a:r>
+              <a:rPr lang="en-US" dirty="0"/>
+              <a:t>Resource draining</a:t>
+            </a:r>
+          </a:p>
+          <a:p>
+            <a:r>
+              <a:rPr lang="en-US" dirty="0"/>
+              <a:t>Noise can appear as </a:t>
+            </a:r>
+            <a:r>
+              <a:rPr lang="en-US" dirty="0" err="1"/>
+              <a:t>evesdropping</a:t>
+            </a:r>
+            <a:endParaRPr lang="en-US" dirty="0"/>
+          </a:p>
         </p:txBody>
       </p:sp>
     </p:spTree>

</xml_diff>